<commit_message>
Update Presentazione e doc
</commit_message>
<xml_diff>
--- a/docs/Presentazione.pptx
+++ b/docs/Presentazione.pptx
@@ -5,26 +5,28 @@
     <p:sldMasterId id="2147483648" r:id="rId1"/>
   </p:sldMasterIdLst>
   <p:notesMasterIdLst>
-    <p:notesMasterId r:id="rId19"/>
+    <p:notesMasterId r:id="rId21"/>
   </p:notesMasterIdLst>
   <p:sldIdLst>
     <p:sldId id="256" r:id="rId2"/>
     <p:sldId id="257" r:id="rId3"/>
-    <p:sldId id="258" r:id="rId4"/>
-    <p:sldId id="269" r:id="rId5"/>
-    <p:sldId id="259" r:id="rId6"/>
-    <p:sldId id="260" r:id="rId7"/>
-    <p:sldId id="270" r:id="rId8"/>
-    <p:sldId id="262" r:id="rId9"/>
-    <p:sldId id="271" r:id="rId10"/>
-    <p:sldId id="263" r:id="rId11"/>
-    <p:sldId id="264" r:id="rId12"/>
-    <p:sldId id="272" r:id="rId13"/>
-    <p:sldId id="273" r:id="rId14"/>
-    <p:sldId id="265" r:id="rId15"/>
-    <p:sldId id="267" r:id="rId16"/>
-    <p:sldId id="266" r:id="rId17"/>
-    <p:sldId id="268" r:id="rId18"/>
+    <p:sldId id="269" r:id="rId4"/>
+    <p:sldId id="259" r:id="rId5"/>
+    <p:sldId id="260" r:id="rId6"/>
+    <p:sldId id="270" r:id="rId7"/>
+    <p:sldId id="262" r:id="rId8"/>
+    <p:sldId id="271" r:id="rId9"/>
+    <p:sldId id="263" r:id="rId10"/>
+    <p:sldId id="264" r:id="rId11"/>
+    <p:sldId id="272" r:id="rId12"/>
+    <p:sldId id="273" r:id="rId13"/>
+    <p:sldId id="265" r:id="rId14"/>
+    <p:sldId id="267" r:id="rId15"/>
+    <p:sldId id="276" r:id="rId16"/>
+    <p:sldId id="277" r:id="rId17"/>
+    <p:sldId id="266" r:id="rId18"/>
+    <p:sldId id="275" r:id="rId19"/>
+    <p:sldId id="274" r:id="rId20"/>
   </p:sldIdLst>
   <p:sldSz cx="12192000" cy="6858000"/>
   <p:notesSz cx="6858000" cy="9144000"/>
@@ -581,7 +583,7 @@
           <a:p>
             <a:fld id="{1A2372DB-15AD-4D1B-981A-0C557383DB34}" type="slidenum">
               <a:rPr lang="it-IT" smtClean="0"/>
-              <a:t>10</a:t>
+              <a:t>9</a:t>
             </a:fld>
             <a:endParaRPr lang="it-IT"/>
           </a:p>
@@ -665,7 +667,7 @@
           <a:p>
             <a:fld id="{1A2372DB-15AD-4D1B-981A-0C557383DB34}" type="slidenum">
               <a:rPr lang="it-IT" smtClean="0"/>
-              <a:t>11</a:t>
+              <a:t>10</a:t>
             </a:fld>
             <a:endParaRPr lang="it-IT"/>
           </a:p>
@@ -940,7 +942,7 @@
           <a:p>
             <a:fld id="{1A2372DB-15AD-4D1B-981A-0C557383DB34}" type="slidenum">
               <a:rPr lang="it-IT" smtClean="0"/>
-              <a:t>12</a:t>
+              <a:t>11</a:t>
             </a:fld>
             <a:endParaRPr lang="it-IT"/>
           </a:p>
@@ -1152,7 +1154,7 @@
           <a:p>
             <a:fld id="{1A2372DB-15AD-4D1B-981A-0C557383DB34}" type="slidenum">
               <a:rPr lang="it-IT" smtClean="0"/>
-              <a:t>13</a:t>
+              <a:t>12</a:t>
             </a:fld>
             <a:endParaRPr lang="it-IT"/>
           </a:p>
@@ -4508,99 +4510,6 @@
           <p:cNvPr id="2" name="Titolo 1">
             <a:extLst>
               <a:ext uri="{FF2B5EF4-FFF2-40B4-BE49-F238E27FC236}">
-                <a16:creationId xmlns:a16="http://schemas.microsoft.com/office/drawing/2014/main" id="{D3E6C80D-A389-41E6-B725-547142420645}"/>
-              </a:ext>
-            </a:extLst>
-          </p:cNvPr>
-          <p:cNvSpPr>
-            <a:spLocks noGrp="1"/>
-          </p:cNvSpPr>
-          <p:nvPr>
-            <p:ph type="title"/>
-          </p:nvPr>
-        </p:nvSpPr>
-        <p:spPr/>
-        <p:txBody>
-          <a:bodyPr/>
-          <a:lstStyle/>
-          <a:p>
-            <a:r>
-              <a:rPr lang="it-IT" dirty="0"/>
-              <a:t>Schema Logico</a:t>
-            </a:r>
-          </a:p>
-        </p:txBody>
-      </p:sp>
-      <p:pic>
-        <p:nvPicPr>
-          <p:cNvPr id="5" name="Segnaposto contenuto 4">
-            <a:extLst>
-              <a:ext uri="{FF2B5EF4-FFF2-40B4-BE49-F238E27FC236}">
-                <a16:creationId xmlns:a16="http://schemas.microsoft.com/office/drawing/2014/main" id="{89BEF299-2FBB-4AD7-B12B-277B491D1320}"/>
-              </a:ext>
-            </a:extLst>
-          </p:cNvPr>
-          <p:cNvPicPr>
-            <a:picLocks noGrp="1" noChangeAspect="1"/>
-          </p:cNvPicPr>
-          <p:nvPr>
-            <p:ph idx="1"/>
-          </p:nvPr>
-        </p:nvPicPr>
-        <p:blipFill>
-          <a:blip r:embed="rId3">
-            <a:extLst>
-              <a:ext uri="{28A0092B-C50C-407E-A947-70E740481C1C}">
-                <a14:useLocalDpi xmlns:a14="http://schemas.microsoft.com/office/drawing/2010/main" val="0"/>
-              </a:ext>
-            </a:extLst>
-          </a:blip>
-          <a:stretch>
-            <a:fillRect/>
-          </a:stretch>
-        </p:blipFill>
-        <p:spPr>
-          <a:xfrm>
-            <a:off x="1922107" y="1463114"/>
-            <a:ext cx="8276252" cy="5032857"/>
-          </a:xfrm>
-        </p:spPr>
-      </p:pic>
-    </p:spTree>
-    <p:extLst>
-      <p:ext uri="{BB962C8B-B14F-4D97-AF65-F5344CB8AC3E}">
-        <p14:creationId xmlns:p14="http://schemas.microsoft.com/office/powerpoint/2010/main" val="389895582"/>
-      </p:ext>
-    </p:extLst>
-  </p:cSld>
-  <p:clrMapOvr>
-    <a:masterClrMapping/>
-  </p:clrMapOvr>
-</p:sld>
-</file>
-
-<file path=ppt/slides/slide11.xml><?xml version="1.0" encoding="utf-8"?>
-<p:sld xmlns:a="http://schemas.openxmlformats.org/drawingml/2006/main" xmlns:r="http://schemas.openxmlformats.org/officeDocument/2006/relationships" xmlns:p="http://schemas.openxmlformats.org/presentationml/2006/main">
-  <p:cSld>
-    <p:spTree>
-      <p:nvGrpSpPr>
-        <p:cNvPr id="1" name=""/>
-        <p:cNvGrpSpPr/>
-        <p:nvPr/>
-      </p:nvGrpSpPr>
-      <p:grpSpPr>
-        <a:xfrm>
-          <a:off x="0" y="0"/>
-          <a:ext cx="0" cy="0"/>
-          <a:chOff x="0" y="0"/>
-          <a:chExt cx="0" cy="0"/>
-        </a:xfrm>
-      </p:grpSpPr>
-      <p:sp>
-        <p:nvSpPr>
-          <p:cNvPr id="2" name="Titolo 1">
-            <a:extLst>
-              <a:ext uri="{FF2B5EF4-FFF2-40B4-BE49-F238E27FC236}">
                 <a16:creationId xmlns:a16="http://schemas.microsoft.com/office/drawing/2014/main" id="{D70C237B-26A8-4EB3-B603-9D655672C037}"/>
               </a:ext>
             </a:extLst>
@@ -4712,7 +4621,7 @@
 </p:sld>
 </file>
 
-<file path=ppt/slides/slide12.xml><?xml version="1.0" encoding="utf-8"?>
+<file path=ppt/slides/slide11.xml><?xml version="1.0" encoding="utf-8"?>
 <p:sld xmlns:a="http://schemas.openxmlformats.org/drawingml/2006/main" xmlns:r="http://schemas.openxmlformats.org/officeDocument/2006/relationships" xmlns:p="http://schemas.openxmlformats.org/presentationml/2006/main">
   <p:cSld>
     <p:spTree>
@@ -4847,7 +4756,7 @@
 </p:sld>
 </file>
 
-<file path=ppt/slides/slide13.xml><?xml version="1.0" encoding="utf-8"?>
+<file path=ppt/slides/slide12.xml><?xml version="1.0" encoding="utf-8"?>
 <p:sld xmlns:a="http://schemas.openxmlformats.org/drawingml/2006/main" xmlns:r="http://schemas.openxmlformats.org/officeDocument/2006/relationships" xmlns:p="http://schemas.openxmlformats.org/presentationml/2006/main">
   <p:cSld>
     <p:spTree>
@@ -4982,6 +4891,99 @@
 </p:sld>
 </file>
 
+<file path=ppt/slides/slide13.xml><?xml version="1.0" encoding="utf-8"?>
+<p:sld xmlns:a="http://schemas.openxmlformats.org/drawingml/2006/main" xmlns:r="http://schemas.openxmlformats.org/officeDocument/2006/relationships" xmlns:p="http://schemas.openxmlformats.org/presentationml/2006/main">
+  <p:cSld>
+    <p:spTree>
+      <p:nvGrpSpPr>
+        <p:cNvPr id="1" name=""/>
+        <p:cNvGrpSpPr/>
+        <p:nvPr/>
+      </p:nvGrpSpPr>
+      <p:grpSpPr>
+        <a:xfrm>
+          <a:off x="0" y="0"/>
+          <a:ext cx="0" cy="0"/>
+          <a:chOff x="0" y="0"/>
+          <a:chExt cx="0" cy="0"/>
+        </a:xfrm>
+      </p:grpSpPr>
+      <p:sp>
+        <p:nvSpPr>
+          <p:cNvPr id="2" name="Titolo 1">
+            <a:extLst>
+              <a:ext uri="{FF2B5EF4-FFF2-40B4-BE49-F238E27FC236}">
+                <a16:creationId xmlns:a16="http://schemas.microsoft.com/office/drawing/2014/main" id="{0FBAD031-EEFB-48A8-8068-88B6B23EB44F}"/>
+              </a:ext>
+            </a:extLst>
+          </p:cNvPr>
+          <p:cNvSpPr>
+            <a:spLocks noGrp="1"/>
+          </p:cNvSpPr>
+          <p:nvPr>
+            <p:ph type="title"/>
+          </p:nvPr>
+        </p:nvSpPr>
+        <p:spPr/>
+        <p:txBody>
+          <a:bodyPr/>
+          <a:lstStyle/>
+          <a:p>
+            <a:r>
+              <a:rPr lang="it-IT" dirty="0"/>
+              <a:t>Design Procedurale</a:t>
+            </a:r>
+          </a:p>
+        </p:txBody>
+      </p:sp>
+      <p:pic>
+        <p:nvPicPr>
+          <p:cNvPr id="5" name="Segnaposto contenuto 4">
+            <a:extLst>
+              <a:ext uri="{FF2B5EF4-FFF2-40B4-BE49-F238E27FC236}">
+                <a16:creationId xmlns:a16="http://schemas.microsoft.com/office/drawing/2014/main" id="{C2BCEC0A-31D7-4B3E-BF1F-1A3B9D3A7231}"/>
+              </a:ext>
+            </a:extLst>
+          </p:cNvPr>
+          <p:cNvPicPr>
+            <a:picLocks noGrp="1" noChangeAspect="1"/>
+          </p:cNvPicPr>
+          <p:nvPr>
+            <p:ph idx="1"/>
+          </p:nvPr>
+        </p:nvPicPr>
+        <p:blipFill>
+          <a:blip r:embed="rId2">
+            <a:extLst>
+              <a:ext uri="{28A0092B-C50C-407E-A947-70E740481C1C}">
+                <a14:useLocalDpi xmlns:a14="http://schemas.microsoft.com/office/drawing/2010/main" val="0"/>
+              </a:ext>
+            </a:extLst>
+          </a:blip>
+          <a:stretch>
+            <a:fillRect/>
+          </a:stretch>
+        </p:blipFill>
+        <p:spPr>
+          <a:xfrm>
+            <a:off x="1663959" y="1276545"/>
+            <a:ext cx="8864081" cy="5333472"/>
+          </a:xfrm>
+        </p:spPr>
+      </p:pic>
+    </p:spTree>
+    <p:extLst>
+      <p:ext uri="{BB962C8B-B14F-4D97-AF65-F5344CB8AC3E}">
+        <p14:creationId xmlns:p14="http://schemas.microsoft.com/office/powerpoint/2010/main" val="1823152659"/>
+      </p:ext>
+    </p:extLst>
+  </p:cSld>
+  <p:clrMapOvr>
+    <a:masterClrMapping/>
+  </p:clrMapOvr>
+</p:sld>
+</file>
+
 <file path=ppt/slides/slide14.xml><?xml version="1.0" encoding="utf-8"?>
 <p:sld xmlns:a="http://schemas.openxmlformats.org/drawingml/2006/main" xmlns:r="http://schemas.openxmlformats.org/officeDocument/2006/relationships" xmlns:p="http://schemas.openxmlformats.org/presentationml/2006/main">
   <p:cSld>
@@ -5004,7 +5006,7 @@
           <p:cNvPr id="2" name="Titolo 1">
             <a:extLst>
               <a:ext uri="{FF2B5EF4-FFF2-40B4-BE49-F238E27FC236}">
-                <a16:creationId xmlns:a16="http://schemas.microsoft.com/office/drawing/2014/main" id="{0FBAD031-EEFB-48A8-8068-88B6B23EB44F}"/>
+                <a16:creationId xmlns:a16="http://schemas.microsoft.com/office/drawing/2014/main" id="{D9DB1A45-7BDA-497D-8B17-A436CE5839CC}"/>
               </a:ext>
             </a:extLst>
           </p:cNvPr>
@@ -5021,51 +5023,77 @@
           <a:lstStyle/>
           <a:p>
             <a:r>
-              <a:rPr lang="it-IT" dirty="0"/>
-              <a:t>Design Procedurale</a:t>
-            </a:r>
-          </a:p>
-        </p:txBody>
-      </p:sp>
-      <p:pic>
-        <p:nvPicPr>
-          <p:cNvPr id="5" name="Segnaposto contenuto 4">
-            <a:extLst>
-              <a:ext uri="{FF2B5EF4-FFF2-40B4-BE49-F238E27FC236}">
-                <a16:creationId xmlns:a16="http://schemas.microsoft.com/office/drawing/2014/main" id="{C2BCEC0A-31D7-4B3E-BF1F-1A3B9D3A7231}"/>
-              </a:ext>
-            </a:extLst>
-          </p:cNvPr>
-          <p:cNvPicPr>
-            <a:picLocks noGrp="1" noChangeAspect="1"/>
-          </p:cNvPicPr>
+              <a:rPr lang="it-IT" dirty="0" smtClean="0"/>
+              <a:t>Drone controller - DroneController </a:t>
+            </a:r>
+            <a:endParaRPr lang="it-IT" dirty="0"/>
+          </a:p>
+        </p:txBody>
+      </p:sp>
+      <p:sp>
+        <p:nvSpPr>
+          <p:cNvPr id="3" name="Segnaposto contenuto 2">
+            <a:extLst>
+              <a:ext uri="{FF2B5EF4-FFF2-40B4-BE49-F238E27FC236}">
+                <a16:creationId xmlns:a16="http://schemas.microsoft.com/office/drawing/2014/main" id="{8455C13B-AAA1-4CB0-A85F-80610FAFB468}"/>
+              </a:ext>
+            </a:extLst>
+          </p:cNvPr>
+          <p:cNvSpPr>
+            <a:spLocks noGrp="1"/>
+          </p:cNvSpPr>
           <p:nvPr>
             <p:ph idx="1"/>
           </p:nvPr>
-        </p:nvPicPr>
-        <p:blipFill>
-          <a:blip r:embed="rId2">
-            <a:extLst>
-              <a:ext uri="{28A0092B-C50C-407E-A947-70E740481C1C}">
-                <a14:useLocalDpi xmlns:a14="http://schemas.microsoft.com/office/drawing/2010/main" val="0"/>
-              </a:ext>
-            </a:extLst>
-          </a:blip>
-          <a:stretch>
-            <a:fillRect/>
-          </a:stretch>
-        </p:blipFill>
-        <p:spPr>
-          <a:xfrm>
-            <a:off x="1663959" y="1276545"/>
-            <a:ext cx="8864081" cy="5333472"/>
-          </a:xfrm>
-        </p:spPr>
-      </p:pic>
+        </p:nvSpPr>
+        <p:spPr/>
+        <p:txBody>
+          <a:bodyPr/>
+          <a:lstStyle/>
+          <a:p>
+            <a:r>
+              <a:rPr lang="it-IT" dirty="0" smtClean="0"/>
+              <a:t>Permette di leggere i comandi della mano dal  Sensore </a:t>
+            </a:r>
+            <a:r>
+              <a:rPr lang="it-IT" dirty="0" err="1" smtClean="0"/>
+              <a:t>LeapMotion</a:t>
+            </a:r>
+            <a:r>
+              <a:rPr lang="it-IT" dirty="0" smtClean="0"/>
+              <a:t>.</a:t>
+            </a:r>
+          </a:p>
+          <a:p>
+            <a:endParaRPr lang="it-IT" dirty="0"/>
+          </a:p>
+          <a:p>
+            <a:r>
+              <a:rPr lang="it-IT" dirty="0" smtClean="0"/>
+              <a:t>I valori vengono mandati alla classe </a:t>
+            </a:r>
+            <a:r>
+              <a:rPr lang="it-IT" dirty="0" err="1" smtClean="0"/>
+              <a:t>CommandManager</a:t>
+            </a:r>
+            <a:endParaRPr lang="it-IT" dirty="0" smtClean="0"/>
+          </a:p>
+          <a:p>
+            <a:endParaRPr lang="it-IT" dirty="0"/>
+          </a:p>
+          <a:p>
+            <a:r>
+              <a:rPr lang="it-IT" dirty="0" smtClean="0"/>
+              <a:t>Controllo altezza e rollio con mano sinistra e movimento con mano destra.</a:t>
+            </a:r>
+            <a:endParaRPr lang="it-IT" dirty="0"/>
+          </a:p>
+        </p:txBody>
+      </p:sp>
     </p:spTree>
     <p:extLst>
       <p:ext uri="{BB962C8B-B14F-4D97-AF65-F5344CB8AC3E}">
-        <p14:creationId xmlns:p14="http://schemas.microsoft.com/office/powerpoint/2010/main" val="1823152659"/>
+        <p14:creationId xmlns:p14="http://schemas.microsoft.com/office/powerpoint/2010/main" val="96611309"/>
       </p:ext>
     </p:extLst>
   </p:cSld>
@@ -5114,9 +5142,18 @@
           <a:lstStyle/>
           <a:p>
             <a:r>
-              <a:rPr lang="it-IT" dirty="0"/>
-              <a:t>Implementazione - Drone Controller</a:t>
-            </a:r>
+              <a:rPr lang="it-IT" dirty="0" smtClean="0"/>
+              <a:t>Drone controller - </a:t>
+            </a:r>
+            <a:r>
+              <a:rPr lang="it-IT" dirty="0" err="1" smtClean="0"/>
+              <a:t>DroneControllerMonitor</a:t>
+            </a:r>
+            <a:r>
+              <a:rPr lang="it-IT" dirty="0" smtClean="0"/>
+              <a:t> </a:t>
+            </a:r>
+            <a:endParaRPr lang="it-IT" dirty="0"/>
           </a:p>
         </p:txBody>
       </p:sp>
@@ -5141,6 +5178,39 @@
           <a:bodyPr/>
           <a:lstStyle/>
           <a:p>
+            <a:r>
+              <a:rPr lang="it-IT" dirty="0" smtClean="0"/>
+              <a:t>GUI del controller, contiene le </a:t>
+            </a:r>
+            <a:r>
+              <a:rPr lang="it-IT" dirty="0" err="1" smtClean="0"/>
+              <a:t>view</a:t>
+            </a:r>
+            <a:r>
+              <a:rPr lang="it-IT" dirty="0" smtClean="0"/>
+              <a:t> per usare il drone senz</a:t>
+            </a:r>
+            <a:r>
+              <a:rPr lang="it-IT" dirty="0" smtClean="0"/>
+              <a:t>a il sensore </a:t>
+            </a:r>
+            <a:r>
+              <a:rPr lang="it-IT" dirty="0" err="1" smtClean="0"/>
+              <a:t>LeapMotion</a:t>
+            </a:r>
+            <a:r>
+              <a:rPr lang="it-IT" dirty="0" smtClean="0"/>
+              <a:t>.</a:t>
+            </a:r>
+          </a:p>
+          <a:p>
+            <a:endParaRPr lang="it-IT" dirty="0"/>
+          </a:p>
+          <a:p>
+            <a:r>
+              <a:rPr lang="it-IT" dirty="0" smtClean="0"/>
+              <a:t>Permette di vedere i log del drone, mandare comandi singoli, impostare file di configurazione e riprodurre e registrare un volo.</a:t>
+            </a:r>
             <a:endParaRPr lang="it-IT" dirty="0"/>
           </a:p>
         </p:txBody>
@@ -5148,7 +5218,7 @@
     </p:spTree>
     <p:extLst>
       <p:ext uri="{BB962C8B-B14F-4D97-AF65-F5344CB8AC3E}">
-        <p14:creationId xmlns:p14="http://schemas.microsoft.com/office/powerpoint/2010/main" val="96611309"/>
+        <p14:creationId xmlns:p14="http://schemas.microsoft.com/office/powerpoint/2010/main" val="281161654"/>
       </p:ext>
     </p:extLst>
   </p:cSld>
@@ -5180,7 +5250,7 @@
           <p:cNvPr id="2" name="Titolo 1">
             <a:extLst>
               <a:ext uri="{FF2B5EF4-FFF2-40B4-BE49-F238E27FC236}">
-                <a16:creationId xmlns:a16="http://schemas.microsoft.com/office/drawing/2014/main" id="{3F0FD37A-1D5D-455E-952B-8DE034811EEA}"/>
+                <a16:creationId xmlns:a16="http://schemas.microsoft.com/office/drawing/2014/main" id="{D9DB1A45-7BDA-497D-8B17-A436CE5839CC}"/>
               </a:ext>
             </a:extLst>
           </p:cNvPr>
@@ -5197,9 +5267,18 @@
           <a:lstStyle/>
           <a:p>
             <a:r>
-              <a:rPr lang="it-IT" dirty="0"/>
-              <a:t>Implementazione - Drone Simulator</a:t>
-            </a:r>
+              <a:rPr lang="it-IT" dirty="0" smtClean="0"/>
+              <a:t>Drone controller - </a:t>
+            </a:r>
+            <a:r>
+              <a:rPr lang="it-IT" dirty="0" err="1" smtClean="0"/>
+              <a:t>CommandManager</a:t>
+            </a:r>
+            <a:r>
+              <a:rPr lang="it-IT" dirty="0" smtClean="0"/>
+              <a:t> </a:t>
+            </a:r>
+            <a:endParaRPr lang="it-IT" dirty="0"/>
           </a:p>
         </p:txBody>
       </p:sp>
@@ -5208,7 +5287,7 @@
           <p:cNvPr id="3" name="Segnaposto contenuto 2">
             <a:extLst>
               <a:ext uri="{FF2B5EF4-FFF2-40B4-BE49-F238E27FC236}">
-                <a16:creationId xmlns:a16="http://schemas.microsoft.com/office/drawing/2014/main" id="{1593BB8D-6234-4254-B769-11C59281A250}"/>
+                <a16:creationId xmlns:a16="http://schemas.microsoft.com/office/drawing/2014/main" id="{8455C13B-AAA1-4CB0-A85F-80610FAFB468}"/>
               </a:ext>
             </a:extLst>
           </p:cNvPr>
@@ -5224,6 +5303,23 @@
           <a:bodyPr/>
           <a:lstStyle/>
           <a:p>
+            <a:r>
+              <a:rPr lang="it-IT" dirty="0" smtClean="0"/>
+              <a:t>Classe usata per l’invio dei comandi e la ricezione delle risposte del drone.</a:t>
+            </a:r>
+          </a:p>
+          <a:p>
+            <a:endParaRPr lang="it-IT" dirty="0"/>
+          </a:p>
+          <a:p>
+            <a:r>
+              <a:rPr lang="it-IT" dirty="0" smtClean="0"/>
+              <a:t>Usato da DroneController e </a:t>
+            </a:r>
+            <a:r>
+              <a:rPr lang="it-IT" dirty="0" err="1" smtClean="0"/>
+              <a:t>DroneControllerMonitor</a:t>
+            </a:r>
             <a:endParaRPr lang="it-IT" dirty="0"/>
           </a:p>
         </p:txBody>
@@ -5231,7 +5327,7 @@
     </p:spTree>
     <p:extLst>
       <p:ext uri="{BB962C8B-B14F-4D97-AF65-F5344CB8AC3E}">
-        <p14:creationId xmlns:p14="http://schemas.microsoft.com/office/powerpoint/2010/main" val="889728263"/>
+        <p14:creationId xmlns:p14="http://schemas.microsoft.com/office/powerpoint/2010/main" val="1976589331"/>
       </p:ext>
     </p:extLst>
   </p:cSld>
@@ -5263,7 +5359,7 @@
           <p:cNvPr id="2" name="Titolo 1">
             <a:extLst>
               <a:ext uri="{FF2B5EF4-FFF2-40B4-BE49-F238E27FC236}">
-                <a16:creationId xmlns:a16="http://schemas.microsoft.com/office/drawing/2014/main" id="{3147DEAE-8114-4FD8-A8DA-73F55ED7CD7E}"/>
+                <a16:creationId xmlns:a16="http://schemas.microsoft.com/office/drawing/2014/main" id="{3F0FD37A-1D5D-455E-952B-8DE034811EEA}"/>
               </a:ext>
             </a:extLst>
           </p:cNvPr>
@@ -5280,9 +5376,10 @@
           <a:lstStyle/>
           <a:p>
             <a:r>
-              <a:rPr lang="it-IT" dirty="0"/>
-              <a:t>Conclusioni</a:t>
-            </a:r>
+              <a:rPr lang="it-IT" dirty="0" smtClean="0"/>
+              <a:t>Drone Simulator - Simulator</a:t>
+            </a:r>
+            <a:endParaRPr lang="it-IT" dirty="0"/>
           </a:p>
         </p:txBody>
       </p:sp>
@@ -5291,7 +5388,7 @@
           <p:cNvPr id="3" name="Segnaposto contenuto 2">
             <a:extLst>
               <a:ext uri="{FF2B5EF4-FFF2-40B4-BE49-F238E27FC236}">
-                <a16:creationId xmlns:a16="http://schemas.microsoft.com/office/drawing/2014/main" id="{D8CAC4C4-2D40-4ECB-87B0-7E1EC66DE40F}"/>
+                <a16:creationId xmlns:a16="http://schemas.microsoft.com/office/drawing/2014/main" id="{1593BB8D-6234-4254-B769-11C59281A250}"/>
               </a:ext>
             </a:extLst>
           </p:cNvPr>
@@ -5307,6 +5404,35 @@
           <a:bodyPr/>
           <a:lstStyle/>
           <a:p>
+            <a:r>
+              <a:rPr lang="it-IT" dirty="0" smtClean="0"/>
+              <a:t>Riceve i comandi in entrata dal sensore </a:t>
+            </a:r>
+            <a:r>
+              <a:rPr lang="it-IT" dirty="0" err="1" smtClean="0"/>
+              <a:t>LeapMotion</a:t>
+            </a:r>
+            <a:r>
+              <a:rPr lang="it-IT" dirty="0" smtClean="0"/>
+              <a:t>.</a:t>
+            </a:r>
+          </a:p>
+          <a:p>
+            <a:endParaRPr lang="it-IT" dirty="0"/>
+          </a:p>
+          <a:p>
+            <a:r>
+              <a:rPr lang="it-IT" dirty="0" smtClean="0"/>
+              <a:t>Inoltro dei comandi verso la classe </a:t>
+            </a:r>
+            <a:r>
+              <a:rPr lang="it-IT" dirty="0" err="1" smtClean="0"/>
+              <a:t>CommandReader</a:t>
+            </a:r>
+            <a:r>
+              <a:rPr lang="it-IT" dirty="0" smtClean="0"/>
+              <a:t>.</a:t>
+            </a:r>
             <a:endParaRPr lang="it-IT" dirty="0"/>
           </a:p>
         </p:txBody>
@@ -5314,7 +5440,250 @@
     </p:spTree>
     <p:extLst>
       <p:ext uri="{BB962C8B-B14F-4D97-AF65-F5344CB8AC3E}">
-        <p14:creationId xmlns:p14="http://schemas.microsoft.com/office/powerpoint/2010/main" val="1415341047"/>
+        <p14:creationId xmlns:p14="http://schemas.microsoft.com/office/powerpoint/2010/main" val="889728263"/>
+      </p:ext>
+    </p:extLst>
+  </p:cSld>
+  <p:clrMapOvr>
+    <a:masterClrMapping/>
+  </p:clrMapOvr>
+</p:sld>
+</file>
+
+<file path=ppt/slides/slide18.xml><?xml version="1.0" encoding="utf-8"?>
+<p:sld xmlns:a="http://schemas.openxmlformats.org/drawingml/2006/main" xmlns:r="http://schemas.openxmlformats.org/officeDocument/2006/relationships" xmlns:p="http://schemas.openxmlformats.org/presentationml/2006/main">
+  <p:cSld>
+    <p:spTree>
+      <p:nvGrpSpPr>
+        <p:cNvPr id="1" name=""/>
+        <p:cNvGrpSpPr/>
+        <p:nvPr/>
+      </p:nvGrpSpPr>
+      <p:grpSpPr>
+        <a:xfrm>
+          <a:off x="0" y="0"/>
+          <a:ext cx="0" cy="0"/>
+          <a:chOff x="0" y="0"/>
+          <a:chExt cx="0" cy="0"/>
+        </a:xfrm>
+      </p:grpSpPr>
+      <p:sp>
+        <p:nvSpPr>
+          <p:cNvPr id="2" name="Titolo 1">
+            <a:extLst>
+              <a:ext uri="{FF2B5EF4-FFF2-40B4-BE49-F238E27FC236}">
+                <a16:creationId xmlns:a16="http://schemas.microsoft.com/office/drawing/2014/main" id="{3F0FD37A-1D5D-455E-952B-8DE034811EEA}"/>
+              </a:ext>
+            </a:extLst>
+          </p:cNvPr>
+          <p:cNvSpPr>
+            <a:spLocks noGrp="1"/>
+          </p:cNvSpPr>
+          <p:nvPr>
+            <p:ph type="title"/>
+          </p:nvPr>
+        </p:nvSpPr>
+        <p:spPr/>
+        <p:txBody>
+          <a:bodyPr/>
+          <a:lstStyle/>
+          <a:p>
+            <a:r>
+              <a:rPr lang="it-IT" dirty="0" smtClean="0"/>
+              <a:t>Drone Simulator - </a:t>
+            </a:r>
+            <a:r>
+              <a:rPr lang="it-IT" dirty="0" err="1" smtClean="0"/>
+              <a:t>CommandReader</a:t>
+            </a:r>
+            <a:endParaRPr lang="it-IT" dirty="0"/>
+          </a:p>
+        </p:txBody>
+      </p:sp>
+      <p:sp>
+        <p:nvSpPr>
+          <p:cNvPr id="3" name="Segnaposto contenuto 2">
+            <a:extLst>
+              <a:ext uri="{FF2B5EF4-FFF2-40B4-BE49-F238E27FC236}">
+                <a16:creationId xmlns:a16="http://schemas.microsoft.com/office/drawing/2014/main" id="{1593BB8D-6234-4254-B769-11C59281A250}"/>
+              </a:ext>
+            </a:extLst>
+          </p:cNvPr>
+          <p:cNvSpPr>
+            <a:spLocks noGrp="1"/>
+          </p:cNvSpPr>
+          <p:nvPr>
+            <p:ph idx="1"/>
+          </p:nvPr>
+        </p:nvSpPr>
+        <p:spPr/>
+        <p:txBody>
+          <a:bodyPr/>
+          <a:lstStyle/>
+          <a:p>
+            <a:r>
+              <a:rPr lang="it-IT" dirty="0" smtClean="0"/>
+              <a:t>Riceve i comandi dalla classe Simulator.</a:t>
+            </a:r>
+          </a:p>
+          <a:p>
+            <a:endParaRPr lang="it-IT" dirty="0" smtClean="0"/>
+          </a:p>
+          <a:p>
+            <a:r>
+              <a:rPr lang="it-IT" dirty="0" smtClean="0"/>
+              <a:t>Simula i comandi della SDK di Tello. </a:t>
+            </a:r>
+          </a:p>
+          <a:p>
+            <a:endParaRPr lang="it-IT" dirty="0"/>
+          </a:p>
+          <a:p>
+            <a:r>
+              <a:rPr lang="it-IT" dirty="0" smtClean="0"/>
+              <a:t>Aggiorna le variabili contenenti informazioni su</a:t>
+            </a:r>
+            <a:br>
+              <a:rPr lang="it-IT" dirty="0" smtClean="0"/>
+            </a:br>
+            <a:r>
+              <a:rPr lang="it-IT" dirty="0" smtClean="0"/>
+              <a:t>Posizione e rotazione del drone.</a:t>
+            </a:r>
+            <a:endParaRPr lang="it-IT" dirty="0"/>
+          </a:p>
+        </p:txBody>
+      </p:sp>
+    </p:spTree>
+    <p:extLst>
+      <p:ext uri="{BB962C8B-B14F-4D97-AF65-F5344CB8AC3E}">
+        <p14:creationId xmlns:p14="http://schemas.microsoft.com/office/powerpoint/2010/main" val="156223483"/>
+      </p:ext>
+    </p:extLst>
+  </p:cSld>
+  <p:clrMapOvr>
+    <a:masterClrMapping/>
+  </p:clrMapOvr>
+</p:sld>
+</file>
+
+<file path=ppt/slides/slide19.xml><?xml version="1.0" encoding="utf-8"?>
+<p:sld xmlns:a="http://schemas.openxmlformats.org/drawingml/2006/main" xmlns:r="http://schemas.openxmlformats.org/officeDocument/2006/relationships" xmlns:p="http://schemas.openxmlformats.org/presentationml/2006/main">
+  <p:cSld>
+    <p:spTree>
+      <p:nvGrpSpPr>
+        <p:cNvPr id="1" name=""/>
+        <p:cNvGrpSpPr/>
+        <p:nvPr/>
+      </p:nvGrpSpPr>
+      <p:grpSpPr>
+        <a:xfrm>
+          <a:off x="0" y="0"/>
+          <a:ext cx="0" cy="0"/>
+          <a:chOff x="0" y="0"/>
+          <a:chExt cx="0" cy="0"/>
+        </a:xfrm>
+      </p:grpSpPr>
+      <p:sp>
+        <p:nvSpPr>
+          <p:cNvPr id="2" name="Titolo 1">
+            <a:extLst>
+              <a:ext uri="{FF2B5EF4-FFF2-40B4-BE49-F238E27FC236}">
+                <a16:creationId xmlns:a16="http://schemas.microsoft.com/office/drawing/2014/main" id="{3F0FD37A-1D5D-455E-952B-8DE034811EEA}"/>
+              </a:ext>
+            </a:extLst>
+          </p:cNvPr>
+          <p:cNvSpPr>
+            <a:spLocks noGrp="1"/>
+          </p:cNvSpPr>
+          <p:nvPr>
+            <p:ph type="title"/>
+          </p:nvPr>
+        </p:nvSpPr>
+        <p:spPr/>
+        <p:txBody>
+          <a:bodyPr/>
+          <a:lstStyle/>
+          <a:p>
+            <a:r>
+              <a:rPr lang="it-IT" dirty="0" smtClean="0"/>
+              <a:t>Drone Simulator - </a:t>
+            </a:r>
+            <a:r>
+              <a:rPr lang="it-IT" dirty="0" err="1" smtClean="0"/>
+              <a:t>TelloChartFrame</a:t>
+            </a:r>
+            <a:endParaRPr lang="it-IT" dirty="0"/>
+          </a:p>
+        </p:txBody>
+      </p:sp>
+      <p:sp>
+        <p:nvSpPr>
+          <p:cNvPr id="3" name="Segnaposto contenuto 2">
+            <a:extLst>
+              <a:ext uri="{FF2B5EF4-FFF2-40B4-BE49-F238E27FC236}">
+                <a16:creationId xmlns:a16="http://schemas.microsoft.com/office/drawing/2014/main" id="{1593BB8D-6234-4254-B769-11C59281A250}"/>
+              </a:ext>
+            </a:extLst>
+          </p:cNvPr>
+          <p:cNvSpPr>
+            <a:spLocks noGrp="1"/>
+          </p:cNvSpPr>
+          <p:nvPr>
+            <p:ph idx="1"/>
+          </p:nvPr>
+        </p:nvSpPr>
+        <p:spPr/>
+        <p:txBody>
+          <a:bodyPr/>
+          <a:lstStyle/>
+          <a:p>
+            <a:r>
+              <a:rPr lang="it-IT" dirty="0" smtClean="0"/>
+              <a:t>Mostra i dati del drone contenuti nella classe Simulator in un </a:t>
+            </a:r>
+            <a:r>
+              <a:rPr lang="it-IT" dirty="0" err="1" smtClean="0"/>
+              <a:t>Jframe</a:t>
+            </a:r>
+            <a:r>
+              <a:rPr lang="it-IT" dirty="0" smtClean="0"/>
+              <a:t>.</a:t>
+            </a:r>
+          </a:p>
+          <a:p>
+            <a:endParaRPr lang="it-IT" dirty="0"/>
+          </a:p>
+          <a:p>
+            <a:r>
+              <a:rPr lang="it-IT" dirty="0" smtClean="0"/>
+              <a:t>Grafici posizione dall’alto e di profilo e di rotazione.</a:t>
+            </a:r>
+          </a:p>
+          <a:p>
+            <a:endParaRPr lang="it-IT" dirty="0"/>
+          </a:p>
+          <a:p>
+            <a:r>
+              <a:rPr lang="it-IT" dirty="0" smtClean="0"/>
+              <a:t>Uso della libreria </a:t>
+            </a:r>
+            <a:r>
+              <a:rPr lang="it-IT" dirty="0" err="1" smtClean="0"/>
+              <a:t>JFreeChart</a:t>
+            </a:r>
+            <a:r>
+              <a:rPr lang="it-IT" dirty="0" smtClean="0"/>
+              <a:t> per la creazione dei grafici.</a:t>
+            </a:r>
+            <a:endParaRPr lang="it-IT" dirty="0"/>
+          </a:p>
+        </p:txBody>
+      </p:sp>
+    </p:spTree>
+    <p:extLst>
+      <p:ext uri="{BB962C8B-B14F-4D97-AF65-F5344CB8AC3E}">
+        <p14:creationId xmlns:p14="http://schemas.microsoft.com/office/powerpoint/2010/main" val="3045248137"/>
       </p:ext>
     </p:extLst>
   </p:cSld>
@@ -5401,15 +5770,10 @@
           <a:lstStyle/>
           <a:p>
             <a:r>
-              <a:rPr lang="it-IT" dirty="0"/>
-              <a:t>Informazioni </a:t>
-            </a:r>
-          </a:p>
-          <a:p>
-            <a:r>
-              <a:rPr lang="it-IT" dirty="0"/>
+              <a:rPr lang="it-IT" dirty="0" smtClean="0"/>
               <a:t>Scopo </a:t>
             </a:r>
+            <a:endParaRPr lang="it-IT" dirty="0"/>
           </a:p>
           <a:p>
             <a:r>
@@ -5431,17 +5795,9 @@
           </a:p>
           <a:p>
             <a:r>
-              <a:rPr lang="it-IT" dirty="0"/>
+              <a:rPr lang="it-IT" dirty="0" smtClean="0"/>
               <a:t>Implementazione</a:t>
             </a:r>
-          </a:p>
-          <a:p>
-            <a:r>
-              <a:rPr lang="it-IT" dirty="0"/>
-              <a:t>Conclusioni</a:t>
-            </a:r>
-          </a:p>
-          <a:p>
             <a:endParaRPr lang="it-IT" dirty="0"/>
           </a:p>
         </p:txBody>
@@ -5481,7 +5837,7 @@
           <p:cNvPr id="2" name="Titolo 1">
             <a:extLst>
               <a:ext uri="{FF2B5EF4-FFF2-40B4-BE49-F238E27FC236}">
-                <a16:creationId xmlns:a16="http://schemas.microsoft.com/office/drawing/2014/main" id="{E99A97A5-E608-4718-A91E-2A348FCB2968}"/>
+                <a16:creationId xmlns:a16="http://schemas.microsoft.com/office/drawing/2014/main" id="{ABD397D9-B961-4B23-97BC-B19692FB03F4}"/>
               </a:ext>
             </a:extLst>
           </p:cNvPr>
@@ -5499,7 +5855,7 @@
           <a:p>
             <a:r>
               <a:rPr lang="it-IT" dirty="0"/>
-              <a:t>Informazioni</a:t>
+              <a:t>Scopo</a:t>
             </a:r>
           </a:p>
         </p:txBody>
@@ -5509,7 +5865,7 @@
           <p:cNvPr id="3" name="Segnaposto contenuto 2">
             <a:extLst>
               <a:ext uri="{FF2B5EF4-FFF2-40B4-BE49-F238E27FC236}">
-                <a16:creationId xmlns:a16="http://schemas.microsoft.com/office/drawing/2014/main" id="{09AA9676-F8CE-403E-8283-2152B4C28269}"/>
+                <a16:creationId xmlns:a16="http://schemas.microsoft.com/office/drawing/2014/main" id="{40E87D02-6AC6-4ED3-9205-EA03554CBC61}"/>
               </a:ext>
             </a:extLst>
           </p:cNvPr>
@@ -5525,14 +5881,34 @@
           <a:bodyPr/>
           <a:lstStyle/>
           <a:p>
-            <a:endParaRPr lang="it-IT"/>
+            <a:r>
+              <a:rPr lang="it-IT" dirty="0"/>
+              <a:t>Creazione di un sistema di controllo per il drone DJI Tello</a:t>
+            </a:r>
+          </a:p>
+          <a:p>
+            <a:r>
+              <a:rPr lang="it-IT" dirty="0"/>
+              <a:t>Uso del sensore </a:t>
+            </a:r>
+            <a:r>
+              <a:rPr lang="it-IT" dirty="0" err="1"/>
+              <a:t>LeapMotion</a:t>
+            </a:r>
+            <a:r>
+              <a:rPr lang="it-IT" dirty="0"/>
+              <a:t> </a:t>
+            </a:r>
+          </a:p>
+          <a:p>
+            <a:endParaRPr lang="it-IT" dirty="0"/>
           </a:p>
         </p:txBody>
       </p:sp>
     </p:spTree>
     <p:extLst>
       <p:ext uri="{BB962C8B-B14F-4D97-AF65-F5344CB8AC3E}">
-        <p14:creationId xmlns:p14="http://schemas.microsoft.com/office/powerpoint/2010/main" val="1293173216"/>
+        <p14:creationId xmlns:p14="http://schemas.microsoft.com/office/powerpoint/2010/main" val="3035399364"/>
       </p:ext>
     </p:extLst>
   </p:cSld>
@@ -5564,7 +5940,7 @@
           <p:cNvPr id="2" name="Titolo 1">
             <a:extLst>
               <a:ext uri="{FF2B5EF4-FFF2-40B4-BE49-F238E27FC236}">
-                <a16:creationId xmlns:a16="http://schemas.microsoft.com/office/drawing/2014/main" id="{ABD397D9-B961-4B23-97BC-B19692FB03F4}"/>
+                <a16:creationId xmlns:a16="http://schemas.microsoft.com/office/drawing/2014/main" id="{A6E38D85-D74D-48A5-902A-B40522E1AF5F}"/>
               </a:ext>
             </a:extLst>
           </p:cNvPr>
@@ -5582,7 +5958,7 @@
           <a:p>
             <a:r>
               <a:rPr lang="it-IT" dirty="0"/>
-              <a:t>Scopo</a:t>
+              <a:t>Analisi dei mezzi</a:t>
             </a:r>
           </a:p>
         </p:txBody>
@@ -5592,7 +5968,7 @@
           <p:cNvPr id="3" name="Segnaposto contenuto 2">
             <a:extLst>
               <a:ext uri="{FF2B5EF4-FFF2-40B4-BE49-F238E27FC236}">
-                <a16:creationId xmlns:a16="http://schemas.microsoft.com/office/drawing/2014/main" id="{40E87D02-6AC6-4ED3-9205-EA03554CBC61}"/>
+                <a16:creationId xmlns:a16="http://schemas.microsoft.com/office/drawing/2014/main" id="{ED48A7F1-701A-410A-BCF6-C3F66DF3BABA}"/>
               </a:ext>
             </a:extLst>
           </p:cNvPr>
@@ -5610,21 +5986,27 @@
           <a:p>
             <a:r>
               <a:rPr lang="it-IT" dirty="0"/>
-              <a:t>Creazione di un sistema di controllo per il drone DJI Tello</a:t>
-            </a:r>
-          </a:p>
-          <a:p>
+              <a:t>Sensore </a:t>
+            </a:r>
+            <a:r>
+              <a:rPr lang="it-IT" dirty="0" err="1"/>
+              <a:t>Leap</a:t>
+            </a:r>
             <a:r>
               <a:rPr lang="it-IT" dirty="0"/>
-              <a:t>Uso del sensore </a:t>
-            </a:r>
-            <a:r>
-              <a:rPr lang="it-IT" dirty="0" err="1"/>
-              <a:t>LeapMotion</a:t>
-            </a:r>
+              <a:t> Motion</a:t>
+            </a:r>
+          </a:p>
+          <a:p>
             <a:r>
               <a:rPr lang="it-IT" dirty="0"/>
-              <a:t> </a:t>
+              <a:t>Drone DJI Tello</a:t>
+            </a:r>
+          </a:p>
+          <a:p>
+            <a:r>
+              <a:rPr lang="it-IT" dirty="0"/>
+              <a:t>Pc</a:t>
             </a:r>
           </a:p>
           <a:p>
@@ -5635,7 +6017,7 @@
     </p:spTree>
     <p:extLst>
       <p:ext uri="{BB962C8B-B14F-4D97-AF65-F5344CB8AC3E}">
-        <p14:creationId xmlns:p14="http://schemas.microsoft.com/office/powerpoint/2010/main" val="3035399364"/>
+        <p14:creationId xmlns:p14="http://schemas.microsoft.com/office/powerpoint/2010/main" val="832984200"/>
       </p:ext>
     </p:extLst>
   </p:cSld>
@@ -5667,7 +6049,7 @@
           <p:cNvPr id="2" name="Titolo 1">
             <a:extLst>
               <a:ext uri="{FF2B5EF4-FFF2-40B4-BE49-F238E27FC236}">
-                <a16:creationId xmlns:a16="http://schemas.microsoft.com/office/drawing/2014/main" id="{A6E38D85-D74D-48A5-902A-B40522E1AF5F}"/>
+                <a16:creationId xmlns:a16="http://schemas.microsoft.com/office/drawing/2014/main" id="{5DCB6089-6698-4FF3-8E7C-468499D5272F}"/>
               </a:ext>
             </a:extLst>
           </p:cNvPr>
@@ -5685,66 +6067,50 @@
           <a:p>
             <a:r>
               <a:rPr lang="it-IT" dirty="0"/>
-              <a:t>Analisi dei mezzi</a:t>
-            </a:r>
-          </a:p>
-        </p:txBody>
-      </p:sp>
-      <p:sp>
-        <p:nvSpPr>
-          <p:cNvPr id="3" name="Segnaposto contenuto 2">
-            <a:extLst>
-              <a:ext uri="{FF2B5EF4-FFF2-40B4-BE49-F238E27FC236}">
-                <a16:creationId xmlns:a16="http://schemas.microsoft.com/office/drawing/2014/main" id="{ED48A7F1-701A-410A-BCF6-C3F66DF3BABA}"/>
-              </a:ext>
-            </a:extLst>
-          </p:cNvPr>
-          <p:cNvSpPr>
-            <a:spLocks noGrp="1"/>
-          </p:cNvSpPr>
+              <a:t>Gantt Preventivo</a:t>
+            </a:r>
+          </a:p>
+        </p:txBody>
+      </p:sp>
+      <p:pic>
+        <p:nvPicPr>
+          <p:cNvPr id="5" name="Segnaposto contenuto 4">
+            <a:extLst>
+              <a:ext uri="{FF2B5EF4-FFF2-40B4-BE49-F238E27FC236}">
+                <a16:creationId xmlns:a16="http://schemas.microsoft.com/office/drawing/2014/main" id="{2024D221-4227-4982-B329-6FA439C39E60}"/>
+              </a:ext>
+            </a:extLst>
+          </p:cNvPr>
+          <p:cNvPicPr>
+            <a:picLocks noGrp="1" noChangeAspect="1"/>
+          </p:cNvPicPr>
           <p:nvPr>
             <p:ph idx="1"/>
           </p:nvPr>
-        </p:nvSpPr>
-        <p:spPr/>
-        <p:txBody>
-          <a:bodyPr/>
-          <a:lstStyle/>
-          <a:p>
-            <a:r>
-              <a:rPr lang="it-IT" dirty="0"/>
-              <a:t>Sensore </a:t>
-            </a:r>
-            <a:r>
-              <a:rPr lang="it-IT" dirty="0" err="1"/>
-              <a:t>Leap</a:t>
-            </a:r>
-            <a:r>
-              <a:rPr lang="it-IT" dirty="0"/>
-              <a:t> Motion</a:t>
-            </a:r>
-          </a:p>
-          <a:p>
-            <a:r>
-              <a:rPr lang="it-IT" dirty="0"/>
-              <a:t>Drone DJI Tello</a:t>
-            </a:r>
-          </a:p>
-          <a:p>
-            <a:r>
-              <a:rPr lang="it-IT" dirty="0"/>
-              <a:t>Pc</a:t>
-            </a:r>
-          </a:p>
-          <a:p>
-            <a:endParaRPr lang="it-IT" dirty="0"/>
-          </a:p>
-        </p:txBody>
-      </p:sp>
+        </p:nvPicPr>
+        <p:blipFill>
+          <a:blip r:embed="rId2">
+            <a:extLst>
+              <a:ext uri="{28A0092B-C50C-407E-A947-70E740481C1C}">
+                <a14:useLocalDpi xmlns:a14="http://schemas.microsoft.com/office/drawing/2010/main" val="0"/>
+              </a:ext>
+            </a:extLst>
+          </a:blip>
+          <a:stretch>
+            <a:fillRect/>
+          </a:stretch>
+        </p:blipFill>
+        <p:spPr>
+          <a:xfrm>
+            <a:off x="838200" y="1535312"/>
+            <a:ext cx="10515600" cy="4931965"/>
+          </a:xfrm>
+        </p:spPr>
+      </p:pic>
     </p:spTree>
     <p:extLst>
       <p:ext uri="{BB962C8B-B14F-4D97-AF65-F5344CB8AC3E}">
-        <p14:creationId xmlns:p14="http://schemas.microsoft.com/office/powerpoint/2010/main" val="832984200"/>
+        <p14:creationId xmlns:p14="http://schemas.microsoft.com/office/powerpoint/2010/main" val="3571388666"/>
       </p:ext>
     </p:extLst>
   </p:cSld>
@@ -5776,7 +6142,7 @@
           <p:cNvPr id="2" name="Titolo 1">
             <a:extLst>
               <a:ext uri="{FF2B5EF4-FFF2-40B4-BE49-F238E27FC236}">
-                <a16:creationId xmlns:a16="http://schemas.microsoft.com/office/drawing/2014/main" id="{5DCB6089-6698-4FF3-8E7C-468499D5272F}"/>
+                <a16:creationId xmlns:a16="http://schemas.microsoft.com/office/drawing/2014/main" id="{B24D6D05-F2B5-4AE7-A004-8AE7B1DF8774}"/>
               </a:ext>
             </a:extLst>
           </p:cNvPr>
@@ -5794,7 +6160,7 @@
           <a:p>
             <a:r>
               <a:rPr lang="it-IT" dirty="0"/>
-              <a:t>Gantt Preventivo</a:t>
+              <a:t>Gantt Consuntivo</a:t>
             </a:r>
           </a:p>
         </p:txBody>
@@ -5804,7 +6170,7 @@
           <p:cNvPr id="5" name="Segnaposto contenuto 4">
             <a:extLst>
               <a:ext uri="{FF2B5EF4-FFF2-40B4-BE49-F238E27FC236}">
-                <a16:creationId xmlns:a16="http://schemas.microsoft.com/office/drawing/2014/main" id="{2024D221-4227-4982-B329-6FA439C39E60}"/>
+                <a16:creationId xmlns:a16="http://schemas.microsoft.com/office/drawing/2014/main" id="{E51A0314-859A-4C53-AC34-872FE7B05A4B}"/>
               </a:ext>
             </a:extLst>
           </p:cNvPr>
@@ -5829,15 +6195,15 @@
         </p:blipFill>
         <p:spPr>
           <a:xfrm>
-            <a:off x="838200" y="1535312"/>
-            <a:ext cx="10515600" cy="4931965"/>
+            <a:off x="838199" y="1533574"/>
+            <a:ext cx="10515599" cy="4935440"/>
           </a:xfrm>
         </p:spPr>
       </p:pic>
     </p:spTree>
     <p:extLst>
       <p:ext uri="{BB962C8B-B14F-4D97-AF65-F5344CB8AC3E}">
-        <p14:creationId xmlns:p14="http://schemas.microsoft.com/office/powerpoint/2010/main" val="3571388666"/>
+        <p14:creationId xmlns:p14="http://schemas.microsoft.com/office/powerpoint/2010/main" val="3691366332"/>
       </p:ext>
     </p:extLst>
   </p:cSld>
@@ -5869,7 +6235,7 @@
           <p:cNvPr id="2" name="Titolo 1">
             <a:extLst>
               <a:ext uri="{FF2B5EF4-FFF2-40B4-BE49-F238E27FC236}">
-                <a16:creationId xmlns:a16="http://schemas.microsoft.com/office/drawing/2014/main" id="{B24D6D05-F2B5-4AE7-A004-8AE7B1DF8774}"/>
+                <a16:creationId xmlns:a16="http://schemas.microsoft.com/office/drawing/2014/main" id="{86131B77-2CAB-4ABE-AB1C-9583BFF5E162}"/>
               </a:ext>
             </a:extLst>
           </p:cNvPr>
@@ -5880,14 +6246,19 @@
             <p:ph type="title"/>
           </p:nvPr>
         </p:nvSpPr>
-        <p:spPr/>
+        <p:spPr>
+          <a:xfrm>
+            <a:off x="838200" y="365125"/>
+            <a:ext cx="10515600" cy="1034467"/>
+          </a:xfrm>
+        </p:spPr>
         <p:txBody>
           <a:bodyPr/>
           <a:lstStyle/>
           <a:p>
             <a:r>
               <a:rPr lang="it-IT" dirty="0"/>
-              <a:t>Gantt Consuntivo</a:t>
+              <a:t>Architettura del sistema - DroneController</a:t>
             </a:r>
           </a:p>
         </p:txBody>
@@ -5897,7 +6268,7 @@
           <p:cNvPr id="5" name="Segnaposto contenuto 4">
             <a:extLst>
               <a:ext uri="{FF2B5EF4-FFF2-40B4-BE49-F238E27FC236}">
-                <a16:creationId xmlns:a16="http://schemas.microsoft.com/office/drawing/2014/main" id="{E51A0314-859A-4C53-AC34-872FE7B05A4B}"/>
+                <a16:creationId xmlns:a16="http://schemas.microsoft.com/office/drawing/2014/main" id="{6A174CF4-11F1-4BAA-875B-EDED8D6A440E}"/>
               </a:ext>
             </a:extLst>
           </p:cNvPr>
@@ -5922,15 +6293,15 @@
         </p:blipFill>
         <p:spPr>
           <a:xfrm>
-            <a:off x="838199" y="1533574"/>
-            <a:ext cx="10515599" cy="4935440"/>
+            <a:off x="1387928" y="1129487"/>
+            <a:ext cx="9416143" cy="5560562"/>
           </a:xfrm>
         </p:spPr>
       </p:pic>
     </p:spTree>
     <p:extLst>
       <p:ext uri="{BB962C8B-B14F-4D97-AF65-F5344CB8AC3E}">
-        <p14:creationId xmlns:p14="http://schemas.microsoft.com/office/powerpoint/2010/main" val="3691366332"/>
+        <p14:creationId xmlns:p14="http://schemas.microsoft.com/office/powerpoint/2010/main" val="2359387926"/>
       </p:ext>
     </p:extLst>
   </p:cSld>
@@ -5962,7 +6333,7 @@
           <p:cNvPr id="2" name="Titolo 1">
             <a:extLst>
               <a:ext uri="{FF2B5EF4-FFF2-40B4-BE49-F238E27FC236}">
-                <a16:creationId xmlns:a16="http://schemas.microsoft.com/office/drawing/2014/main" id="{86131B77-2CAB-4ABE-AB1C-9583BFF5E162}"/>
+                <a16:creationId xmlns:a16="http://schemas.microsoft.com/office/drawing/2014/main" id="{29F3462E-E528-4BBD-8846-4D531BF5AB5C}"/>
               </a:ext>
             </a:extLst>
           </p:cNvPr>
@@ -5976,7 +6347,7 @@
         <p:spPr>
           <a:xfrm>
             <a:off x="838200" y="365125"/>
-            <a:ext cx="10515600" cy="1034467"/>
+            <a:ext cx="10515600" cy="1015806"/>
           </a:xfrm>
         </p:spPr>
         <p:txBody>
@@ -5985,17 +6356,17 @@
           <a:p>
             <a:r>
               <a:rPr lang="it-IT" dirty="0"/>
-              <a:t>Architettura del sistema - DroneController</a:t>
+              <a:t>Architettura del sistema - DroneSimulator</a:t>
             </a:r>
           </a:p>
         </p:txBody>
       </p:sp>
       <p:pic>
         <p:nvPicPr>
-          <p:cNvPr id="5" name="Segnaposto contenuto 4">
-            <a:extLst>
-              <a:ext uri="{FF2B5EF4-FFF2-40B4-BE49-F238E27FC236}">
-                <a16:creationId xmlns:a16="http://schemas.microsoft.com/office/drawing/2014/main" id="{6A174CF4-11F1-4BAA-875B-EDED8D6A440E}"/>
+          <p:cNvPr id="7" name="Segnaposto contenuto 6">
+            <a:extLst>
+              <a:ext uri="{FF2B5EF4-FFF2-40B4-BE49-F238E27FC236}">
+                <a16:creationId xmlns:a16="http://schemas.microsoft.com/office/drawing/2014/main" id="{19FA45B5-E851-41B4-854D-8E333E2A9711}"/>
               </a:ext>
             </a:extLst>
           </p:cNvPr>
@@ -6020,15 +6391,15 @@
         </p:blipFill>
         <p:spPr>
           <a:xfrm>
-            <a:off x="1387928" y="1129487"/>
-            <a:ext cx="9416143" cy="5560562"/>
+            <a:off x="2206744" y="1147666"/>
+            <a:ext cx="7778512" cy="5491073"/>
           </a:xfrm>
         </p:spPr>
       </p:pic>
     </p:spTree>
     <p:extLst>
       <p:ext uri="{BB962C8B-B14F-4D97-AF65-F5344CB8AC3E}">
-        <p14:creationId xmlns:p14="http://schemas.microsoft.com/office/powerpoint/2010/main" val="2359387926"/>
+        <p14:creationId xmlns:p14="http://schemas.microsoft.com/office/powerpoint/2010/main" val="14717307"/>
       </p:ext>
     </p:extLst>
   </p:cSld>
@@ -6060,7 +6431,7 @@
           <p:cNvPr id="2" name="Titolo 1">
             <a:extLst>
               <a:ext uri="{FF2B5EF4-FFF2-40B4-BE49-F238E27FC236}">
-                <a16:creationId xmlns:a16="http://schemas.microsoft.com/office/drawing/2014/main" id="{29F3462E-E528-4BBD-8846-4D531BF5AB5C}"/>
+                <a16:creationId xmlns:a16="http://schemas.microsoft.com/office/drawing/2014/main" id="{D3E6C80D-A389-41E6-B725-547142420645}"/>
               </a:ext>
             </a:extLst>
           </p:cNvPr>
@@ -6071,29 +6442,24 @@
             <p:ph type="title"/>
           </p:nvPr>
         </p:nvSpPr>
-        <p:spPr>
-          <a:xfrm>
-            <a:off x="838200" y="365125"/>
-            <a:ext cx="10515600" cy="1015806"/>
-          </a:xfrm>
-        </p:spPr>
+        <p:spPr/>
         <p:txBody>
           <a:bodyPr/>
           <a:lstStyle/>
           <a:p>
             <a:r>
               <a:rPr lang="it-IT" dirty="0"/>
-              <a:t>Architettura del sistema - DroneSimulator</a:t>
+              <a:t>Schema Logico</a:t>
             </a:r>
           </a:p>
         </p:txBody>
       </p:sp>
       <p:pic>
         <p:nvPicPr>
-          <p:cNvPr id="7" name="Segnaposto contenuto 6">
-            <a:extLst>
-              <a:ext uri="{FF2B5EF4-FFF2-40B4-BE49-F238E27FC236}">
-                <a16:creationId xmlns:a16="http://schemas.microsoft.com/office/drawing/2014/main" id="{19FA45B5-E851-41B4-854D-8E333E2A9711}"/>
+          <p:cNvPr id="5" name="Segnaposto contenuto 4">
+            <a:extLst>
+              <a:ext uri="{FF2B5EF4-FFF2-40B4-BE49-F238E27FC236}">
+                <a16:creationId xmlns:a16="http://schemas.microsoft.com/office/drawing/2014/main" id="{89BEF299-2FBB-4AD7-B12B-277B491D1320}"/>
               </a:ext>
             </a:extLst>
           </p:cNvPr>
@@ -6105,7 +6471,7 @@
           </p:nvPr>
         </p:nvPicPr>
         <p:blipFill>
-          <a:blip r:embed="rId2">
+          <a:blip r:embed="rId3">
             <a:extLst>
               <a:ext uri="{28A0092B-C50C-407E-A947-70E740481C1C}">
                 <a14:useLocalDpi xmlns:a14="http://schemas.microsoft.com/office/drawing/2010/main" val="0"/>
@@ -6118,15 +6484,15 @@
         </p:blipFill>
         <p:spPr>
           <a:xfrm>
-            <a:off x="2206744" y="1147666"/>
-            <a:ext cx="7778512" cy="5491073"/>
+            <a:off x="1922107" y="1463114"/>
+            <a:ext cx="8276252" cy="5032857"/>
           </a:xfrm>
         </p:spPr>
       </p:pic>
     </p:spTree>
     <p:extLst>
       <p:ext uri="{BB962C8B-B14F-4D97-AF65-F5344CB8AC3E}">
-        <p14:creationId xmlns:p14="http://schemas.microsoft.com/office/powerpoint/2010/main" val="14717307"/>
+        <p14:creationId xmlns:p14="http://schemas.microsoft.com/office/powerpoint/2010/main" val="389895582"/>
       </p:ext>
     </p:extLst>
   </p:cSld>

</xml_diff>

<commit_message>
Update pptx + class diagram
</commit_message>
<xml_diff>
--- a/docs/Presentazione.pptx
+++ b/docs/Presentazione.pptx
@@ -6,7 +6,7 @@
     <p:sldMasterId id="2147483661" r:id="rId2"/>
   </p:sldMasterIdLst>
   <p:notesMasterIdLst>
-    <p:notesMasterId r:id="rId26"/>
+    <p:notesMasterId r:id="rId27"/>
   </p:notesMasterIdLst>
   <p:sldIdLst>
     <p:sldId id="256" r:id="rId3"/>
@@ -18,20 +18,21 @@
     <p:sldId id="266" r:id="rId9"/>
     <p:sldId id="267" r:id="rId10"/>
     <p:sldId id="268" r:id="rId11"/>
-    <p:sldId id="269" r:id="rId12"/>
-    <p:sldId id="270" r:id="rId13"/>
-    <p:sldId id="271" r:id="rId14"/>
-    <p:sldId id="272" r:id="rId15"/>
-    <p:sldId id="273" r:id="rId16"/>
-    <p:sldId id="274" r:id="rId17"/>
-    <p:sldId id="279" r:id="rId18"/>
-    <p:sldId id="280" r:id="rId19"/>
-    <p:sldId id="281" r:id="rId20"/>
-    <p:sldId id="282" r:id="rId21"/>
-    <p:sldId id="283" r:id="rId22"/>
-    <p:sldId id="284" r:id="rId23"/>
-    <p:sldId id="285" r:id="rId24"/>
-    <p:sldId id="278" r:id="rId25"/>
+    <p:sldId id="286" r:id="rId12"/>
+    <p:sldId id="269" r:id="rId13"/>
+    <p:sldId id="270" r:id="rId14"/>
+    <p:sldId id="271" r:id="rId15"/>
+    <p:sldId id="272" r:id="rId16"/>
+    <p:sldId id="273" r:id="rId17"/>
+    <p:sldId id="274" r:id="rId18"/>
+    <p:sldId id="279" r:id="rId19"/>
+    <p:sldId id="280" r:id="rId20"/>
+    <p:sldId id="281" r:id="rId21"/>
+    <p:sldId id="282" r:id="rId22"/>
+    <p:sldId id="283" r:id="rId23"/>
+    <p:sldId id="284" r:id="rId24"/>
+    <p:sldId id="285" r:id="rId25"/>
+    <p:sldId id="278" r:id="rId26"/>
   </p:sldIdLst>
   <p:sldSz cx="9144000" cy="5143500" type="screen16x9"/>
   <p:notesSz cx="6858000" cy="9144000"/>
@@ -152,6 +153,7 @@
           <p14:sldIdLst>
             <p14:sldId id="267"/>
             <p14:sldId id="268"/>
+            <p14:sldId id="286"/>
             <p14:sldId id="269"/>
           </p14:sldIdLst>
         </p14:section>
@@ -282,7 +284,7 @@
           <a:p>
             <a:fld id="{0E586627-511B-45A1-B9CA-4576DD49B422}" type="datetimeFigureOut">
               <a:rPr lang="it-CH" smtClean="0"/>
-              <a:t>22.05.2019</a:t>
+              <a:t>24.05.2019</a:t>
             </a:fld>
             <a:endParaRPr lang="it-CH"/>
           </a:p>
@@ -886,6 +888,270 @@
 </p:notes>
 </file>
 
+<file path=ppt/notesSlides/notesSlide5.xml><?xml version="1.0" encoding="utf-8"?>
+<p:notes xmlns:a="http://schemas.openxmlformats.org/drawingml/2006/main" xmlns:r="http://schemas.openxmlformats.org/officeDocument/2006/relationships" xmlns:p="http://schemas.openxmlformats.org/presentationml/2006/main">
+  <p:cSld>
+    <p:spTree>
+      <p:nvGrpSpPr>
+        <p:cNvPr id="1" name=""/>
+        <p:cNvGrpSpPr/>
+        <p:nvPr/>
+      </p:nvGrpSpPr>
+      <p:grpSpPr>
+        <a:xfrm>
+          <a:off x="0" y="0"/>
+          <a:ext cx="0" cy="0"/>
+          <a:chOff x="0" y="0"/>
+          <a:chExt cx="0" cy="0"/>
+        </a:xfrm>
+      </p:grpSpPr>
+      <p:sp>
+        <p:nvSpPr>
+          <p:cNvPr id="2" name="Segnaposto immagine diapositiva 1"/>
+          <p:cNvSpPr>
+            <a:spLocks noGrp="1" noRot="1" noChangeAspect="1"/>
+          </p:cNvSpPr>
+          <p:nvPr>
+            <p:ph type="sldImg"/>
+          </p:nvPr>
+        </p:nvSpPr>
+        <p:spPr/>
+      </p:sp>
+      <p:sp>
+        <p:nvSpPr>
+          <p:cNvPr id="3" name="Segnaposto note 2"/>
+          <p:cNvSpPr>
+            <a:spLocks noGrp="1"/>
+          </p:cNvSpPr>
+          <p:nvPr>
+            <p:ph type="body" idx="1"/>
+          </p:nvPr>
+        </p:nvSpPr>
+        <p:spPr/>
+        <p:txBody>
+          <a:bodyPr/>
+          <a:lstStyle/>
+          <a:p>
+            <a:r>
+              <a:rPr lang="it-CH" sz="3200" dirty="0"/>
+              <a:t>Possiamo dividere il lavoro in due grandi </a:t>
+            </a:r>
+            <a:r>
+              <a:rPr lang="it-CH" sz="3200"/>
+              <a:t>gruppi:</a:t>
+            </a:r>
+          </a:p>
+          <a:p>
+            <a:endParaRPr lang="it-CH" sz="3200" dirty="0"/>
+          </a:p>
+          <a:p>
+            <a:pPr marL="171450" indent="-171450">
+              <a:buFont typeface="Arial" panose="020B0604020202020204" pitchFamily="34" charset="0"/>
+              <a:buChar char="•"/>
+            </a:pPr>
+            <a:r>
+              <a:rPr lang="it-CH" sz="3200" dirty="0" err="1"/>
+              <a:t>DroneController</a:t>
+            </a:r>
+            <a:endParaRPr lang="it-CH" sz="3200" dirty="0"/>
+          </a:p>
+          <a:p>
+            <a:pPr marL="628650" lvl="1" indent="-171450">
+              <a:buFont typeface="Arial" panose="020B0604020202020204" pitchFamily="34" charset="0"/>
+              <a:buChar char="•"/>
+            </a:pPr>
+            <a:r>
+              <a:rPr lang="it-CH" sz="3200" dirty="0"/>
+              <a:t>Luca</a:t>
+            </a:r>
+          </a:p>
+          <a:p>
+            <a:pPr marL="628650" lvl="1" indent="-171450">
+              <a:buFont typeface="Arial" panose="020B0604020202020204" pitchFamily="34" charset="0"/>
+              <a:buChar char="•"/>
+            </a:pPr>
+            <a:r>
+              <a:rPr lang="it-CH" sz="3200" dirty="0" err="1"/>
+              <a:t>Fadil</a:t>
+            </a:r>
+            <a:endParaRPr lang="it-CH" sz="3200" dirty="0"/>
+          </a:p>
+          <a:p>
+            <a:pPr marL="457200" lvl="1" indent="0">
+              <a:buFont typeface="Arial" panose="020B0604020202020204" pitchFamily="34" charset="0"/>
+              <a:buNone/>
+            </a:pPr>
+            <a:endParaRPr lang="it-CH" sz="3200" dirty="0"/>
+          </a:p>
+          <a:p>
+            <a:pPr marL="171450" indent="-171450">
+              <a:buFont typeface="Arial" panose="020B0604020202020204" pitchFamily="34" charset="0"/>
+              <a:buChar char="•"/>
+            </a:pPr>
+            <a:r>
+              <a:rPr lang="it-CH" sz="3200" dirty="0" err="1"/>
+              <a:t>DroneSimulator</a:t>
+            </a:r>
+            <a:endParaRPr lang="it-CH" sz="3200" dirty="0"/>
+          </a:p>
+          <a:p>
+            <a:pPr marL="628650" lvl="1" indent="-171450">
+              <a:buFont typeface="Arial" panose="020B0604020202020204" pitchFamily="34" charset="0"/>
+              <a:buChar char="•"/>
+            </a:pPr>
+            <a:r>
+              <a:rPr lang="it-CH" sz="3200" dirty="0" err="1"/>
+              <a:t>Rausone</a:t>
+            </a:r>
+            <a:endParaRPr lang="it-CH" sz="3200" dirty="0"/>
+          </a:p>
+          <a:p>
+            <a:pPr marL="628650" lvl="1" indent="-171450">
+              <a:buFont typeface="Arial" panose="020B0604020202020204" pitchFamily="34" charset="0"/>
+              <a:buChar char="•"/>
+            </a:pPr>
+            <a:r>
+              <a:rPr lang="it-CH" sz="3200" dirty="0" err="1"/>
+              <a:t>Jari</a:t>
+            </a:r>
+            <a:endParaRPr lang="it-CH" sz="3200" dirty="0"/>
+          </a:p>
+        </p:txBody>
+      </p:sp>
+      <p:sp>
+        <p:nvSpPr>
+          <p:cNvPr id="4" name="Segnaposto numero diapositiva 3"/>
+          <p:cNvSpPr>
+            <a:spLocks noGrp="1"/>
+          </p:cNvSpPr>
+          <p:nvPr>
+            <p:ph type="sldNum" sz="quarter" idx="5"/>
+          </p:nvPr>
+        </p:nvSpPr>
+        <p:spPr/>
+        <p:txBody>
+          <a:bodyPr/>
+          <a:lstStyle/>
+          <a:p>
+            <a:fld id="{FD2CFA8D-4E29-41DB-B61B-69A41B9506B3}" type="slidenum">
+              <a:rPr lang="it-CH" smtClean="0"/>
+              <a:t>8</a:t>
+            </a:fld>
+            <a:endParaRPr lang="it-CH"/>
+          </a:p>
+        </p:txBody>
+      </p:sp>
+    </p:spTree>
+    <p:extLst>
+      <p:ext uri="{BB962C8B-B14F-4D97-AF65-F5344CB8AC3E}">
+        <p14:creationId xmlns:p14="http://schemas.microsoft.com/office/powerpoint/2010/main" val="822517740"/>
+      </p:ext>
+    </p:extLst>
+  </p:cSld>
+  <p:clrMapOvr>
+    <a:masterClrMapping/>
+  </p:clrMapOvr>
+</p:notes>
+</file>
+
+<file path=ppt/notesSlides/notesSlide6.xml><?xml version="1.0" encoding="utf-8"?>
+<p:notes xmlns:a="http://schemas.openxmlformats.org/drawingml/2006/main" xmlns:r="http://schemas.openxmlformats.org/officeDocument/2006/relationships" xmlns:p="http://schemas.openxmlformats.org/presentationml/2006/main">
+  <p:cSld>
+    <p:spTree>
+      <p:nvGrpSpPr>
+        <p:cNvPr id="1" name=""/>
+        <p:cNvGrpSpPr/>
+        <p:nvPr/>
+      </p:nvGrpSpPr>
+      <p:grpSpPr>
+        <a:xfrm>
+          <a:off x="0" y="0"/>
+          <a:ext cx="0" cy="0"/>
+          <a:chOff x="0" y="0"/>
+          <a:chExt cx="0" cy="0"/>
+        </a:xfrm>
+      </p:grpSpPr>
+      <p:sp>
+        <p:nvSpPr>
+          <p:cNvPr id="2" name="Segnaposto immagine diapositiva 1"/>
+          <p:cNvSpPr>
+            <a:spLocks noGrp="1" noRot="1" noChangeAspect="1"/>
+          </p:cNvSpPr>
+          <p:nvPr>
+            <p:ph type="sldImg"/>
+          </p:nvPr>
+        </p:nvSpPr>
+        <p:spPr/>
+      </p:sp>
+      <p:sp>
+        <p:nvSpPr>
+          <p:cNvPr id="3" name="Segnaposto note 2"/>
+          <p:cNvSpPr>
+            <a:spLocks noGrp="1"/>
+          </p:cNvSpPr>
+          <p:nvPr>
+            <p:ph type="body" idx="1"/>
+          </p:nvPr>
+        </p:nvSpPr>
+        <p:spPr/>
+        <p:txBody>
+          <a:bodyPr/>
+          <a:lstStyle/>
+          <a:p>
+            <a:r>
+              <a:rPr lang="it-CH" dirty="0" err="1"/>
+              <a:t>DroneController</a:t>
+            </a:r>
+            <a:r>
+              <a:rPr lang="it-CH" dirty="0"/>
+              <a:t> </a:t>
+            </a:r>
+            <a:r>
+              <a:rPr lang="it-CH" dirty="0">
+                <a:sym typeface="Wingdings" panose="05000000000000000000" pitchFamily="2" charset="2"/>
+              </a:rPr>
+              <a:t> Fulcro di tutto il programma (del controller)</a:t>
+            </a:r>
+            <a:endParaRPr lang="it-CH" dirty="0"/>
+          </a:p>
+        </p:txBody>
+      </p:sp>
+      <p:sp>
+        <p:nvSpPr>
+          <p:cNvPr id="4" name="Segnaposto numero diapositiva 3"/>
+          <p:cNvSpPr>
+            <a:spLocks noGrp="1"/>
+          </p:cNvSpPr>
+          <p:nvPr>
+            <p:ph type="sldNum" sz="quarter" idx="5"/>
+          </p:nvPr>
+        </p:nvSpPr>
+        <p:spPr/>
+        <p:txBody>
+          <a:bodyPr/>
+          <a:lstStyle/>
+          <a:p>
+            <a:fld id="{FD2CFA8D-4E29-41DB-B61B-69A41B9506B3}" type="slidenum">
+              <a:rPr lang="it-CH" smtClean="0"/>
+              <a:t>9</a:t>
+            </a:fld>
+            <a:endParaRPr lang="it-CH"/>
+          </a:p>
+        </p:txBody>
+      </p:sp>
+    </p:spTree>
+    <p:extLst>
+      <p:ext uri="{BB962C8B-B14F-4D97-AF65-F5344CB8AC3E}">
+        <p14:creationId xmlns:p14="http://schemas.microsoft.com/office/powerpoint/2010/main" val="1983135393"/>
+      </p:ext>
+    </p:extLst>
+  </p:cSld>
+  <p:clrMapOvr>
+    <a:masterClrMapping/>
+  </p:clrMapOvr>
+</p:notes>
+</file>
+
 <file path=ppt/slideLayouts/slideLayout1.xml><?xml version="1.0" encoding="utf-8"?>
 <p:sldLayout xmlns:a="http://schemas.openxmlformats.org/drawingml/2006/main" xmlns:r="http://schemas.openxmlformats.org/officeDocument/2006/relationships" xmlns:p="http://schemas.openxmlformats.org/presentationml/2006/main" showMasterSp="0" preserve="1" userDrawn="1">
   <p:cSld name="Title Slide">
@@ -964,7 +1230,7 @@
           <a:p>
             <a:fld id="{63937D59-5EDB-4C39-B697-625748F703B6}" type="datetimeFigureOut">
               <a:rPr lang="en-US" smtClean="0"/>
-              <a:t>5/22/2019</a:t>
+              <a:t>5/24/2019</a:t>
             </a:fld>
             <a:endParaRPr lang="en-US"/>
           </a:p>
@@ -1239,7 +1505,7 @@
           <a:p>
             <a:fld id="{63937D59-5EDB-4C39-B697-625748F703B6}" type="datetimeFigureOut">
               <a:rPr lang="en-US" smtClean="0"/>
-              <a:t>5/22/2019</a:t>
+              <a:t>5/24/2019</a:t>
             </a:fld>
             <a:endParaRPr lang="en-US"/>
           </a:p>
@@ -1491,7 +1757,7 @@
           <a:p>
             <a:fld id="{63937D59-5EDB-4C39-B697-625748F703B6}" type="datetimeFigureOut">
               <a:rPr lang="en-US" smtClean="0"/>
-              <a:t>5/22/2019</a:t>
+              <a:t>5/24/2019</a:t>
             </a:fld>
             <a:endParaRPr lang="en-US"/>
           </a:p>
@@ -1659,7 +1925,7 @@
           <a:p>
             <a:fld id="{63937D59-5EDB-4C39-B697-625748F703B6}" type="datetimeFigureOut">
               <a:rPr lang="en-US" smtClean="0"/>
-              <a:t>5/22/2019</a:t>
+              <a:t>5/24/2019</a:t>
             </a:fld>
             <a:endParaRPr lang="en-US"/>
           </a:p>
@@ -1837,7 +2103,7 @@
           <a:p>
             <a:fld id="{63937D59-5EDB-4C39-B697-625748F703B6}" type="datetimeFigureOut">
               <a:rPr lang="en-US" smtClean="0"/>
-              <a:t>5/22/2019</a:t>
+              <a:t>5/24/2019</a:t>
             </a:fld>
             <a:endParaRPr lang="en-US"/>
           </a:p>
@@ -2433,7 +2699,7 @@
           <a:p>
             <a:fld id="{63937D59-5EDB-4C39-B697-625748F703B6}" type="datetimeFigureOut">
               <a:rPr lang="en-US" smtClean="0"/>
-              <a:t>5/22/2019</a:t>
+              <a:t>5/24/2019</a:t>
             </a:fld>
             <a:endParaRPr lang="en-US"/>
           </a:p>
@@ -2601,7 +2867,7 @@
           <a:p>
             <a:fld id="{63937D59-5EDB-4C39-B697-625748F703B6}" type="datetimeFigureOut">
               <a:rPr lang="en-US" smtClean="0"/>
-              <a:t>5/22/2019</a:t>
+              <a:t>5/24/2019</a:t>
             </a:fld>
             <a:endParaRPr lang="en-US"/>
           </a:p>
@@ -2846,7 +3112,7 @@
           <a:p>
             <a:fld id="{63937D59-5EDB-4C39-B697-625748F703B6}" type="datetimeFigureOut">
               <a:rPr lang="en-US" smtClean="0"/>
-              <a:t>5/22/2019</a:t>
+              <a:t>5/24/2019</a:t>
             </a:fld>
             <a:endParaRPr lang="en-US"/>
           </a:p>
@@ -3131,7 +3397,7 @@
           <a:p>
             <a:fld id="{63937D59-5EDB-4C39-B697-625748F703B6}" type="datetimeFigureOut">
               <a:rPr lang="en-US" smtClean="0"/>
-              <a:t>5/22/2019</a:t>
+              <a:t>5/24/2019</a:t>
             </a:fld>
             <a:endParaRPr lang="en-US"/>
           </a:p>
@@ -3550,7 +3816,7 @@
           <a:p>
             <a:fld id="{63937D59-5EDB-4C39-B697-625748F703B6}" type="datetimeFigureOut">
               <a:rPr lang="en-US" smtClean="0"/>
-              <a:t>5/22/2019</a:t>
+              <a:t>5/24/2019</a:t>
             </a:fld>
             <a:endParaRPr lang="en-US"/>
           </a:p>
@@ -3667,7 +3933,7 @@
           <a:p>
             <a:fld id="{63937D59-5EDB-4C39-B697-625748F703B6}" type="datetimeFigureOut">
               <a:rPr lang="en-US" smtClean="0"/>
-              <a:t>5/22/2019</a:t>
+              <a:t>5/24/2019</a:t>
             </a:fld>
             <a:endParaRPr lang="en-US"/>
           </a:p>
@@ -4169,7 +4435,7 @@
           <a:p>
             <a:fld id="{63937D59-5EDB-4C39-B697-625748F703B6}" type="datetimeFigureOut">
               <a:rPr lang="en-US" smtClean="0"/>
-              <a:t>5/22/2019</a:t>
+              <a:t>5/24/2019</a:t>
             </a:fld>
             <a:endParaRPr lang="en-US"/>
           </a:p>
@@ -4857,6 +5123,79 @@
 <file path=ppt/slides/slide10.xml><?xml version="1.0" encoding="utf-8"?>
 <p:sld xmlns:a="http://schemas.openxmlformats.org/drawingml/2006/main" xmlns:r="http://schemas.openxmlformats.org/officeDocument/2006/relationships" xmlns:p="http://schemas.openxmlformats.org/presentationml/2006/main">
   <p:cSld>
+    <p:spTree>
+      <p:nvGrpSpPr>
+        <p:cNvPr id="1" name=""/>
+        <p:cNvGrpSpPr/>
+        <p:nvPr/>
+      </p:nvGrpSpPr>
+      <p:grpSpPr>
+        <a:xfrm>
+          <a:off x="0" y="0"/>
+          <a:ext cx="0" cy="0"/>
+          <a:chOff x="0" y="0"/>
+          <a:chExt cx="0" cy="0"/>
+        </a:xfrm>
+      </p:grpSpPr>
+      <p:sp>
+        <p:nvSpPr>
+          <p:cNvPr id="2" name="CasellaDiTesto 1">
+            <a:extLst>
+              <a:ext uri="{FF2B5EF4-FFF2-40B4-BE49-F238E27FC236}">
+                <a16:creationId xmlns:a16="http://schemas.microsoft.com/office/drawing/2014/main" id="{DF28166C-8E73-4EE8-AFBA-89D1898088EA}"/>
+              </a:ext>
+            </a:extLst>
+          </p:cNvPr>
+          <p:cNvSpPr txBox="1"/>
+          <p:nvPr/>
+        </p:nvSpPr>
+        <p:spPr>
+          <a:xfrm>
+            <a:off x="899592" y="1203598"/>
+            <a:ext cx="7344816" cy="2554545"/>
+          </a:xfrm>
+          <a:prstGeom prst="rect">
+            <a:avLst/>
+          </a:prstGeom>
+          <a:noFill/>
+        </p:spPr>
+        <p:txBody>
+          <a:bodyPr wrap="square" rtlCol="0">
+            <a:spAutoFit/>
+          </a:bodyPr>
+          <a:lstStyle/>
+          <a:p>
+            <a:pPr algn="ctr"/>
+            <a:r>
+              <a:rPr lang="it-CH" sz="8000" dirty="0"/>
+              <a:t>AGGIORNARE </a:t>
+            </a:r>
+          </a:p>
+          <a:p>
+            <a:pPr algn="ctr"/>
+            <a:r>
+              <a:rPr lang="it-CH" sz="8000" dirty="0"/>
+              <a:t>UML</a:t>
+            </a:r>
+          </a:p>
+        </p:txBody>
+      </p:sp>
+    </p:spTree>
+    <p:extLst>
+      <p:ext uri="{BB962C8B-B14F-4D97-AF65-F5344CB8AC3E}">
+        <p14:creationId xmlns:p14="http://schemas.microsoft.com/office/powerpoint/2010/main" val="1595527845"/>
+      </p:ext>
+    </p:extLst>
+  </p:cSld>
+  <p:clrMapOvr>
+    <a:masterClrMapping/>
+  </p:clrMapOvr>
+</p:sld>
+</file>
+
+<file path=ppt/slides/slide11.xml><?xml version="1.0" encoding="utf-8"?>
+<p:sld xmlns:a="http://schemas.openxmlformats.org/drawingml/2006/main" xmlns:r="http://schemas.openxmlformats.org/officeDocument/2006/relationships" xmlns:p="http://schemas.openxmlformats.org/presentationml/2006/main">
+  <p:cSld>
     <p:bg>
       <p:bgPr>
         <a:solidFill>
@@ -4928,7 +5267,7 @@
 </p:sld>
 </file>
 
-<file path=ppt/slides/slide11.xml><?xml version="1.0" encoding="utf-8"?>
+<file path=ppt/slides/slide12.xml><?xml version="1.0" encoding="utf-8"?>
 <p:sld xmlns:a="http://schemas.openxmlformats.org/drawingml/2006/main" xmlns:r="http://schemas.openxmlformats.org/officeDocument/2006/relationships" xmlns:p="http://schemas.openxmlformats.org/presentationml/2006/main">
   <p:cSld>
     <p:spTree>
@@ -4993,7 +5332,7 @@
 </p:sld>
 </file>
 
-<file path=ppt/slides/slide12.xml><?xml version="1.0" encoding="utf-8"?>
+<file path=ppt/slides/slide13.xml><?xml version="1.0" encoding="utf-8"?>
 <p:sld xmlns:a="http://schemas.openxmlformats.org/drawingml/2006/main" xmlns:r="http://schemas.openxmlformats.org/officeDocument/2006/relationships" xmlns:p="http://schemas.openxmlformats.org/presentationml/2006/main">
   <p:cSld>
     <p:spTree>
@@ -5133,7 +5472,7 @@
 </p:sld>
 </file>
 
-<file path=ppt/slides/slide13.xml><?xml version="1.0" encoding="utf-8"?>
+<file path=ppt/slides/slide14.xml><?xml version="1.0" encoding="utf-8"?>
 <p:sld xmlns:a="http://schemas.openxmlformats.org/drawingml/2006/main" xmlns:r="http://schemas.openxmlformats.org/officeDocument/2006/relationships" xmlns:p="http://schemas.openxmlformats.org/presentationml/2006/main">
   <p:cSld>
     <p:bg>
@@ -5510,7 +5849,7 @@
 </p:sld>
 </file>
 
-<file path=ppt/slides/slide14.xml><?xml version="1.0" encoding="utf-8"?>
+<file path=ppt/slides/slide15.xml><?xml version="1.0" encoding="utf-8"?>
 <p:sld xmlns:a="http://schemas.openxmlformats.org/drawingml/2006/main" xmlns:r="http://schemas.openxmlformats.org/officeDocument/2006/relationships" xmlns:p="http://schemas.openxmlformats.org/presentationml/2006/main">
   <p:cSld>
     <p:spTree>
@@ -5614,123 +5953,6 @@
 </p:sld>
 </file>
 
-<file path=ppt/slides/slide15.xml><?xml version="1.0" encoding="utf-8"?>
-<p:sld xmlns:a="http://schemas.openxmlformats.org/drawingml/2006/main" xmlns:r="http://schemas.openxmlformats.org/officeDocument/2006/relationships" xmlns:p="http://schemas.openxmlformats.org/presentationml/2006/main">
-  <p:cSld>
-    <p:spTree>
-      <p:nvGrpSpPr>
-        <p:cNvPr id="1" name=""/>
-        <p:cNvGrpSpPr/>
-        <p:nvPr/>
-      </p:nvGrpSpPr>
-      <p:grpSpPr>
-        <a:xfrm>
-          <a:off x="0" y="0"/>
-          <a:ext cx="0" cy="0"/>
-          <a:chOff x="0" y="0"/>
-          <a:chExt cx="0" cy="0"/>
-        </a:xfrm>
-      </p:grpSpPr>
-      <p:sp>
-        <p:nvSpPr>
-          <p:cNvPr id="2" name="Titolo 1">
-            <a:extLst>
-              <a:ext uri="{FF2B5EF4-FFF2-40B4-BE49-F238E27FC236}">
-                <a16:creationId xmlns:a16="http://schemas.microsoft.com/office/drawing/2014/main" id="{D9D1A5C6-17BF-4092-A0E1-85A255481368}"/>
-              </a:ext>
-            </a:extLst>
-          </p:cNvPr>
-          <p:cNvSpPr>
-            <a:spLocks noGrp="1"/>
-          </p:cNvSpPr>
-          <p:nvPr>
-            <p:ph type="title"/>
-          </p:nvPr>
-        </p:nvSpPr>
-        <p:spPr>
-          <a:xfrm>
-            <a:off x="323528" y="123478"/>
-            <a:ext cx="9144000" cy="1285096"/>
-          </a:xfrm>
-        </p:spPr>
-        <p:txBody>
-          <a:bodyPr/>
-          <a:lstStyle/>
-          <a:p>
-            <a:r>
-              <a:rPr lang="it-CH" sz="5400" dirty="0"/>
-              <a:t>IMPLEMENTAZIONE</a:t>
-            </a:r>
-          </a:p>
-        </p:txBody>
-      </p:sp>
-      <p:sp>
-        <p:nvSpPr>
-          <p:cNvPr id="4" name="Segnaposto contenuto 3">
-            <a:extLst>
-              <a:ext uri="{FF2B5EF4-FFF2-40B4-BE49-F238E27FC236}">
-                <a16:creationId xmlns:a16="http://schemas.microsoft.com/office/drawing/2014/main" id="{009804A4-6B3D-4E19-A2EB-87BD64193F1A}"/>
-              </a:ext>
-            </a:extLst>
-          </p:cNvPr>
-          <p:cNvSpPr>
-            <a:spLocks noGrp="1"/>
-          </p:cNvSpPr>
-          <p:nvPr>
-            <p:ph idx="10"/>
-          </p:nvPr>
-        </p:nvSpPr>
-        <p:spPr>
-          <a:xfrm>
-            <a:off x="323528" y="1272952"/>
-            <a:ext cx="8496944" cy="2995737"/>
-          </a:xfrm>
-        </p:spPr>
-        <p:txBody>
-          <a:bodyPr/>
-          <a:lstStyle/>
-          <a:p>
-            <a:pPr marL="457200" indent="-457200">
-              <a:lnSpc>
-                <a:spcPct val="250000"/>
-              </a:lnSpc>
-              <a:buFont typeface="Arial" panose="020B0604020202020204" pitchFamily="34" charset="0"/>
-              <a:buChar char="•"/>
-            </a:pPr>
-            <a:r>
-              <a:rPr lang="it-CH" sz="2800" dirty="0" err="1"/>
-              <a:t>DroneController</a:t>
-            </a:r>
-            <a:endParaRPr lang="it-CH" sz="2800" dirty="0"/>
-          </a:p>
-          <a:p>
-            <a:pPr marL="457200" indent="-457200">
-              <a:lnSpc>
-                <a:spcPct val="250000"/>
-              </a:lnSpc>
-              <a:buFont typeface="Arial" panose="020B0604020202020204" pitchFamily="34" charset="0"/>
-              <a:buChar char="•"/>
-            </a:pPr>
-            <a:r>
-              <a:rPr lang="it-CH" sz="2800" dirty="0"/>
-              <a:t>Drone simulator</a:t>
-            </a:r>
-          </a:p>
-        </p:txBody>
-      </p:sp>
-    </p:spTree>
-    <p:extLst>
-      <p:ext uri="{BB962C8B-B14F-4D97-AF65-F5344CB8AC3E}">
-        <p14:creationId xmlns:p14="http://schemas.microsoft.com/office/powerpoint/2010/main" val="2631092496"/>
-      </p:ext>
-    </p:extLst>
-  </p:cSld>
-  <p:clrMapOvr>
-    <a:masterClrMapping/>
-  </p:clrMapOvr>
-</p:sld>
-</file>
-
 <file path=ppt/slides/slide16.xml><?xml version="1.0" encoding="utf-8"?>
 <p:sld xmlns:a="http://schemas.openxmlformats.org/drawingml/2006/main" xmlns:r="http://schemas.openxmlformats.org/officeDocument/2006/relationships" xmlns:p="http://schemas.openxmlformats.org/presentationml/2006/main">
   <p:cSld>
@@ -5753,7 +5975,7 @@
           <p:cNvPr id="2" name="Titolo 1">
             <a:extLst>
               <a:ext uri="{FF2B5EF4-FFF2-40B4-BE49-F238E27FC236}">
-                <a16:creationId xmlns:a16="http://schemas.microsoft.com/office/drawing/2014/main" id="{1C9728DE-DCC3-47F3-A9A7-4840BBF3A649}"/>
+                <a16:creationId xmlns:a16="http://schemas.microsoft.com/office/drawing/2014/main" id="{D9D1A5C6-17BF-4092-A0E1-85A255481368}"/>
               </a:ext>
             </a:extLst>
           </p:cNvPr>
@@ -5764,25 +5986,29 @@
             <p:ph type="title"/>
           </p:nvPr>
         </p:nvSpPr>
-        <p:spPr/>
-        <p:txBody>
-          <a:bodyPr/>
-          <a:lstStyle/>
-          <a:p>
-            <a:r>
-              <a:rPr lang="it-CH" dirty="0" err="1"/>
-              <a:t>DroneController</a:t>
-            </a:r>
-            <a:endParaRPr lang="it-CH" dirty="0"/>
-          </a:p>
-        </p:txBody>
-      </p:sp>
-      <p:sp>
-        <p:nvSpPr>
-          <p:cNvPr id="3" name="Segnaposto contenuto 2">
+        <p:spPr>
+          <a:xfrm>
+            <a:off x="323528" y="123478"/>
+            <a:ext cx="9144000" cy="1285096"/>
+          </a:xfrm>
+        </p:spPr>
+        <p:txBody>
+          <a:bodyPr/>
+          <a:lstStyle/>
+          <a:p>
+            <a:r>
+              <a:rPr lang="it-CH" sz="5400" dirty="0"/>
+              <a:t>IMPLEMENTAZIONE</a:t>
+            </a:r>
+          </a:p>
+        </p:txBody>
+      </p:sp>
+      <p:sp>
+        <p:nvSpPr>
+          <p:cNvPr id="4" name="Segnaposto contenuto 3">
             <a:extLst>
               <a:ext uri="{FF2B5EF4-FFF2-40B4-BE49-F238E27FC236}">
-                <a16:creationId xmlns:a16="http://schemas.microsoft.com/office/drawing/2014/main" id="{A9782E92-4646-4216-BC0B-9AFBD5130E30}"/>
+                <a16:creationId xmlns:a16="http://schemas.microsoft.com/office/drawing/2014/main" id="{009804A4-6B3D-4E19-A2EB-87BD64193F1A}"/>
               </a:ext>
             </a:extLst>
           </p:cNvPr>
@@ -5790,133 +6016,51 @@
             <a:spLocks noGrp="1"/>
           </p:cNvSpPr>
           <p:nvPr>
-            <p:ph idx="1"/>
+            <p:ph idx="10"/>
           </p:nvPr>
         </p:nvSpPr>
         <p:spPr>
           <a:xfrm>
-            <a:off x="2000747" y="884466"/>
-            <a:ext cx="6912768" cy="460648"/>
+            <a:off x="323528" y="1272952"/>
+            <a:ext cx="8496944" cy="2995737"/>
           </a:xfrm>
         </p:spPr>
         <p:txBody>
           <a:bodyPr/>
           <a:lstStyle/>
           <a:p>
-            <a:r>
-              <a:rPr lang="it-CH" sz="2800" dirty="0"/>
-              <a:t>Classe </a:t>
-            </a:r>
-            <a:r>
-              <a:rPr lang="it-CH" sz="2800" dirty="0" err="1"/>
-              <a:t>DroneController</a:t>
-            </a:r>
-            <a:endParaRPr lang="it-CH" sz="2800" dirty="0"/>
-          </a:p>
-        </p:txBody>
-      </p:sp>
-      <p:sp>
-        <p:nvSpPr>
-          <p:cNvPr id="4" name="Segnaposto contenuto 3">
-            <a:extLst>
-              <a:ext uri="{FF2B5EF4-FFF2-40B4-BE49-F238E27FC236}">
-                <a16:creationId xmlns:a16="http://schemas.microsoft.com/office/drawing/2014/main" id="{13544A92-8328-4004-96C8-B60363828F13}"/>
-              </a:ext>
-            </a:extLst>
-          </p:cNvPr>
-          <p:cNvSpPr>
-            <a:spLocks noGrp="1"/>
-          </p:cNvSpPr>
-          <p:nvPr>
-            <p:ph idx="10"/>
-          </p:nvPr>
-        </p:nvSpPr>
-        <p:spPr>
-          <a:xfrm>
-            <a:off x="1990056" y="1664245"/>
-            <a:ext cx="6912768" cy="2995737"/>
-          </a:xfrm>
-        </p:spPr>
-        <p:txBody>
-          <a:bodyPr/>
-          <a:lstStyle/>
-          <a:p>
-            <a:pPr marL="285750" indent="-285750">
+            <a:pPr marL="457200" indent="-457200">
               <a:lnSpc>
-                <a:spcPct val="150000"/>
+                <a:spcPct val="250000"/>
               </a:lnSpc>
               <a:buFont typeface="Arial" panose="020B0604020202020204" pitchFamily="34" charset="0"/>
               <a:buChar char="•"/>
             </a:pPr>
             <a:r>
-              <a:rPr lang="it-CH" sz="2000" dirty="0"/>
-              <a:t>Leggere comandi </a:t>
-            </a:r>
-            <a:r>
-              <a:rPr lang="it-CH" sz="2000" dirty="0" err="1"/>
-              <a:t>LeapMotion</a:t>
-            </a:r>
-            <a:endParaRPr lang="it-CH" sz="2000" dirty="0"/>
-          </a:p>
-          <a:p>
-            <a:pPr marL="1028700" lvl="1">
+              <a:rPr lang="it-CH" sz="2800" dirty="0" err="1"/>
+              <a:t>DroneController</a:t>
+            </a:r>
+            <a:endParaRPr lang="it-CH" sz="2800" dirty="0"/>
+          </a:p>
+          <a:p>
+            <a:pPr marL="457200" indent="-457200">
               <a:lnSpc>
-                <a:spcPct val="150000"/>
+                <a:spcPct val="250000"/>
               </a:lnSpc>
               <a:buFont typeface="Arial" panose="020B0604020202020204" pitchFamily="34" charset="0"/>
               <a:buChar char="•"/>
             </a:pPr>
             <a:r>
-              <a:rPr lang="it-CH" sz="2000" dirty="0"/>
-              <a:t>Altezza</a:t>
-            </a:r>
-          </a:p>
-          <a:p>
-            <a:pPr marL="1028700" lvl="1">
-              <a:lnSpc>
-                <a:spcPct val="150000"/>
-              </a:lnSpc>
-              <a:buFont typeface="Arial" panose="020B0604020202020204" pitchFamily="34" charset="0"/>
-              <a:buChar char="•"/>
-            </a:pPr>
-            <a:r>
-              <a:rPr lang="it-CH" sz="2000" dirty="0"/>
-              <a:t>Rollio, beccheggio ed imbardata</a:t>
-            </a:r>
-          </a:p>
-          <a:p>
-            <a:pPr marL="285750" indent="-285750">
-              <a:lnSpc>
-                <a:spcPct val="150000"/>
-              </a:lnSpc>
-              <a:buFont typeface="Arial" panose="020B0604020202020204" pitchFamily="34" charset="0"/>
-              <a:buChar char="•"/>
-            </a:pPr>
-            <a:r>
-              <a:rPr lang="it-CH" sz="2000" dirty="0"/>
-              <a:t>Inviati al Drone</a:t>
-            </a:r>
-          </a:p>
-          <a:p>
-            <a:pPr marL="1028700" lvl="1">
-              <a:lnSpc>
-                <a:spcPct val="150000"/>
-              </a:lnSpc>
-              <a:buFont typeface="Arial" panose="020B0604020202020204" pitchFamily="34" charset="0"/>
-              <a:buChar char="•"/>
-            </a:pPr>
-            <a:r>
-              <a:rPr lang="it-CH" sz="2000" dirty="0" err="1"/>
-              <a:t>CommandManager</a:t>
-            </a:r>
-            <a:endParaRPr lang="it-CH" sz="2000" dirty="0"/>
+              <a:rPr lang="it-CH" sz="2800" dirty="0"/>
+              <a:t>Drone simulator</a:t>
+            </a:r>
           </a:p>
         </p:txBody>
       </p:sp>
     </p:spTree>
     <p:extLst>
       <p:ext uri="{BB962C8B-B14F-4D97-AF65-F5344CB8AC3E}">
-        <p14:creationId xmlns:p14="http://schemas.microsoft.com/office/powerpoint/2010/main" val="1615021837"/>
+        <p14:creationId xmlns:p14="http://schemas.microsoft.com/office/powerpoint/2010/main" val="2631092496"/>
       </p:ext>
     </p:extLst>
   </p:cSld>
@@ -6003,12 +6147,8 @@
               <a:t>Classe </a:t>
             </a:r>
             <a:r>
-              <a:rPr lang="it-IT" sz="2800" dirty="0" err="1"/>
-              <a:t>DroneControllerMonitor</a:t>
-            </a:r>
-            <a:r>
-              <a:rPr lang="it-IT" sz="2800" dirty="0"/>
-              <a:t> </a:t>
+              <a:rPr lang="it-CH" sz="2800" dirty="0" err="1"/>
+              <a:t>DroneController</a:t>
             </a:r>
             <a:endParaRPr lang="it-CH" sz="2800" dirty="0"/>
           </a:p>
@@ -6049,8 +6189,13 @@
             </a:pPr>
             <a:r>
               <a:rPr lang="it-CH" sz="2000" dirty="0"/>
-              <a:t>GUI</a:t>
-            </a:r>
+              <a:t>Leggere comandi </a:t>
+            </a:r>
+            <a:r>
+              <a:rPr lang="it-CH" sz="2000" dirty="0" err="1"/>
+              <a:t>LeapMotion</a:t>
+            </a:r>
+            <a:endParaRPr lang="it-CH" sz="2000" dirty="0"/>
           </a:p>
           <a:p>
             <a:pPr marL="1028700" lvl="1">
@@ -6062,7 +6207,7 @@
             </a:pPr>
             <a:r>
               <a:rPr lang="it-CH" sz="2000" dirty="0"/>
-              <a:t>Controllo drone </a:t>
+              <a:t>Altezza</a:t>
             </a:r>
           </a:p>
           <a:p>
@@ -6075,7 +6220,20 @@
             </a:pPr>
             <a:r>
               <a:rPr lang="it-CH" sz="2000" dirty="0"/>
-              <a:t>Recording</a:t>
+              <a:t>Rollio, beccheggio ed imbardata</a:t>
+            </a:r>
+          </a:p>
+          <a:p>
+            <a:pPr marL="285750" indent="-285750">
+              <a:lnSpc>
+                <a:spcPct val="150000"/>
+              </a:lnSpc>
+              <a:buFont typeface="Arial" panose="020B0604020202020204" pitchFamily="34" charset="0"/>
+              <a:buChar char="•"/>
+            </a:pPr>
+            <a:r>
+              <a:rPr lang="it-CH" sz="2000" dirty="0"/>
+              <a:t>Inviati al Drone</a:t>
             </a:r>
           </a:p>
           <a:p>
@@ -6088,29 +6246,16 @@
             </a:pPr>
             <a:r>
               <a:rPr lang="it-CH" sz="2000" dirty="0" err="1"/>
-              <a:t>Config</a:t>
+              <a:t>CommandManager</a:t>
             </a:r>
             <a:endParaRPr lang="it-CH" sz="2000" dirty="0"/>
-          </a:p>
-          <a:p>
-            <a:pPr marL="1028700" lvl="1">
-              <a:lnSpc>
-                <a:spcPct val="150000"/>
-              </a:lnSpc>
-              <a:buFont typeface="Arial" panose="020B0604020202020204" pitchFamily="34" charset="0"/>
-              <a:buChar char="•"/>
-            </a:pPr>
-            <a:r>
-              <a:rPr lang="it-CH" sz="2000" dirty="0"/>
-              <a:t>Log</a:t>
-            </a:r>
           </a:p>
         </p:txBody>
       </p:sp>
     </p:spTree>
     <p:extLst>
       <p:ext uri="{BB962C8B-B14F-4D97-AF65-F5344CB8AC3E}">
-        <p14:creationId xmlns:p14="http://schemas.microsoft.com/office/powerpoint/2010/main" val="2586380990"/>
+        <p14:creationId xmlns:p14="http://schemas.microsoft.com/office/powerpoint/2010/main" val="1615021837"/>
       </p:ext>
     </p:extLst>
   </p:cSld>
@@ -6198,7 +6343,7 @@
             </a:r>
             <a:r>
               <a:rPr lang="it-IT" sz="2800" dirty="0" err="1"/>
-              <a:t>CommandManager</a:t>
+              <a:t>DroneControllerMonitor</a:t>
             </a:r>
             <a:r>
               <a:rPr lang="it-IT" sz="2800" dirty="0"/>
@@ -6236,118 +6381,75 @@
           <a:p>
             <a:pPr marL="285750" indent="-285750">
               <a:lnSpc>
-                <a:spcPct val="200000"/>
+                <a:spcPct val="150000"/>
               </a:lnSpc>
               <a:buFont typeface="Arial" panose="020B0604020202020204" pitchFamily="34" charset="0"/>
               <a:buChar char="•"/>
             </a:pPr>
             <a:r>
               <a:rPr lang="it-CH" sz="2000" dirty="0"/>
-              <a:t>Invio </a:t>
-            </a:r>
-            <a:r>
-              <a:rPr lang="it-CH" sz="2000" dirty="0">
-                <a:solidFill>
-                  <a:schemeClr val="tx1"/>
-                </a:solidFill>
-                <a:latin typeface="+mn-lt"/>
-                <a:cs typeface="+mn-cs"/>
-              </a:rPr>
-              <a:t>comandi </a:t>
-            </a:r>
-            <a:r>
-              <a:rPr lang="it-CH" sz="2000" dirty="0">
-                <a:solidFill>
-                  <a:schemeClr val="tx1"/>
-                </a:solidFill>
-                <a:latin typeface="+mn-lt"/>
-                <a:cs typeface="+mn-cs"/>
-                <a:sym typeface="Wingdings" panose="05000000000000000000" pitchFamily="2" charset="2"/>
-              </a:rPr>
-              <a:t> </a:t>
-            </a:r>
-            <a:r>
-              <a:rPr lang="it-CH" sz="2000" dirty="0" err="1">
-                <a:solidFill>
-                  <a:schemeClr val="tx1"/>
-                </a:solidFill>
-                <a:latin typeface="+mn-lt"/>
-                <a:cs typeface="+mn-cs"/>
-                <a:sym typeface="Wingdings" panose="05000000000000000000" pitchFamily="2" charset="2"/>
-              </a:rPr>
-              <a:t>Socket</a:t>
-            </a:r>
-            <a:endParaRPr lang="it-CH" sz="2000" dirty="0">
-              <a:solidFill>
-                <a:schemeClr val="tx1"/>
-              </a:solidFill>
-              <a:latin typeface="+mn-lt"/>
-              <a:cs typeface="+mn-cs"/>
-              <a:sym typeface="Wingdings" panose="05000000000000000000" pitchFamily="2" charset="2"/>
-            </a:endParaRPr>
-          </a:p>
-          <a:p>
-            <a:pPr marL="285750" indent="-285750">
+              <a:t>GUI</a:t>
+            </a:r>
+          </a:p>
+          <a:p>
+            <a:pPr marL="1028700" lvl="1">
               <a:lnSpc>
-                <a:spcPct val="200000"/>
+                <a:spcPct val="150000"/>
               </a:lnSpc>
               <a:buFont typeface="Arial" panose="020B0604020202020204" pitchFamily="34" charset="0"/>
               <a:buChar char="•"/>
             </a:pPr>
             <a:r>
-              <a:rPr lang="it-CH" sz="2000" dirty="0">
-                <a:solidFill>
-                  <a:schemeClr val="tx1"/>
-                </a:solidFill>
-                <a:latin typeface="+mn-lt"/>
-                <a:cs typeface="+mn-cs"/>
-                <a:sym typeface="Wingdings" panose="05000000000000000000" pitchFamily="2" charset="2"/>
-              </a:rPr>
-              <a:t>Utilizzato da:</a:t>
+              <a:rPr lang="it-CH" sz="2000" dirty="0"/>
+              <a:t>Controllo drone </a:t>
             </a:r>
           </a:p>
           <a:p>
             <a:pPr marL="1028700" lvl="1">
               <a:lnSpc>
-                <a:spcPct val="200000"/>
+                <a:spcPct val="150000"/>
               </a:lnSpc>
               <a:buFont typeface="Arial" panose="020B0604020202020204" pitchFamily="34" charset="0"/>
               <a:buChar char="•"/>
             </a:pPr>
             <a:r>
-              <a:rPr lang="it-CH" sz="2000" dirty="0" err="1">
-                <a:sym typeface="Wingdings" panose="05000000000000000000" pitchFamily="2" charset="2"/>
-              </a:rPr>
-              <a:t>DroneController</a:t>
-            </a:r>
-            <a:endParaRPr lang="it-CH" sz="2000" dirty="0">
-              <a:sym typeface="Wingdings" panose="05000000000000000000" pitchFamily="2" charset="2"/>
-            </a:endParaRPr>
+              <a:rPr lang="it-CH" sz="2000" dirty="0"/>
+              <a:t>Recording</a:t>
+            </a:r>
           </a:p>
           <a:p>
             <a:pPr marL="1028700" lvl="1">
               <a:lnSpc>
-                <a:spcPct val="200000"/>
+                <a:spcPct val="150000"/>
               </a:lnSpc>
               <a:buFont typeface="Arial" panose="020B0604020202020204" pitchFamily="34" charset="0"/>
               <a:buChar char="•"/>
             </a:pPr>
             <a:r>
-              <a:rPr lang="it-CH" sz="2000" dirty="0" err="1">
-                <a:sym typeface="Wingdings" panose="05000000000000000000" pitchFamily="2" charset="2"/>
-              </a:rPr>
-              <a:t>DroneControllerMonitor</a:t>
-            </a:r>
-            <a:endParaRPr lang="it-CH" sz="2000" dirty="0">
-              <a:sym typeface="Wingdings" panose="05000000000000000000" pitchFamily="2" charset="2"/>
-            </a:endParaRPr>
+              <a:rPr lang="it-CH" sz="2000" dirty="0" err="1"/>
+              <a:t>Config</a:t>
+            </a:r>
+            <a:endParaRPr lang="it-CH" sz="2000" dirty="0"/>
+          </a:p>
+          <a:p>
+            <a:pPr marL="1028700" lvl="1">
+              <a:lnSpc>
+                <a:spcPct val="150000"/>
+              </a:lnSpc>
+              <a:buFont typeface="Arial" panose="020B0604020202020204" pitchFamily="34" charset="0"/>
+              <a:buChar char="•"/>
+            </a:pPr>
+            <a:r>
+              <a:rPr lang="it-CH" sz="2000" dirty="0"/>
+              <a:t>Log</a:t>
+            </a:r>
           </a:p>
         </p:txBody>
       </p:sp>
     </p:spTree>
     <p:extLst>
       <p:ext uri="{BB962C8B-B14F-4D97-AF65-F5344CB8AC3E}">
-        <p14:creationId xmlns:p14="http://schemas.microsoft.com/office/powerpoint/2010/main" val="3679172245"/>
+        <p14:creationId xmlns:p14="http://schemas.microsoft.com/office/powerpoint/2010/main" val="2586380990"/>
       </p:ext>
     </p:extLst>
   </p:cSld>
@@ -6434,8 +6536,8 @@
               <a:t>Classe </a:t>
             </a:r>
             <a:r>
-              <a:rPr lang="it-CH" sz="2800" dirty="0" err="1"/>
-              <a:t>FlightRecorder</a:t>
+              <a:rPr lang="it-IT" sz="2800" dirty="0" err="1"/>
+              <a:t>CommandManager</a:t>
             </a:r>
             <a:r>
               <a:rPr lang="it-IT" sz="2800" dirty="0"/>
@@ -6473,60 +6575,118 @@
           <a:p>
             <a:pPr marL="285750" indent="-285750">
               <a:lnSpc>
-                <a:spcPct val="250000"/>
+                <a:spcPct val="200000"/>
               </a:lnSpc>
               <a:buFont typeface="Arial" panose="020B0604020202020204" pitchFamily="34" charset="0"/>
               <a:buChar char="•"/>
             </a:pPr>
             <a:r>
+              <a:rPr lang="it-CH" sz="2000" dirty="0"/>
+              <a:t>Invio </a:t>
+            </a:r>
+            <a:r>
               <a:rPr lang="it-CH" sz="2000" dirty="0">
+                <a:solidFill>
+                  <a:schemeClr val="tx1"/>
+                </a:solidFill>
+                <a:latin typeface="+mn-lt"/>
+                <a:cs typeface="+mn-cs"/>
+              </a:rPr>
+              <a:t>comandi </a:t>
+            </a:r>
+            <a:r>
+              <a:rPr lang="it-CH" sz="2000" dirty="0">
+                <a:solidFill>
+                  <a:schemeClr val="tx1"/>
+                </a:solidFill>
+                <a:latin typeface="+mn-lt"/>
+                <a:cs typeface="+mn-cs"/>
                 <a:sym typeface="Wingdings" panose="05000000000000000000" pitchFamily="2" charset="2"/>
               </a:rPr>
-              <a:t>Utilizza </a:t>
+              <a:t> </a:t>
             </a:r>
             <a:r>
               <a:rPr lang="it-CH" sz="2000" dirty="0" err="1">
+                <a:solidFill>
+                  <a:schemeClr val="tx1"/>
+                </a:solidFill>
+                <a:latin typeface="+mn-lt"/>
+                <a:cs typeface="+mn-cs"/>
                 <a:sym typeface="Wingdings" panose="05000000000000000000" pitchFamily="2" charset="2"/>
               </a:rPr>
-              <a:t>CommandBuffer</a:t>
-            </a:r>
-            <a:r>
-              <a:rPr lang="it-CH" sz="2000" dirty="0">
-                <a:sym typeface="Wingdings" panose="05000000000000000000" pitchFamily="2" charset="2"/>
-              </a:rPr>
-              <a:t> + </a:t>
-            </a:r>
-            <a:r>
-              <a:rPr lang="it-CH" sz="2000" dirty="0" err="1">
-                <a:sym typeface="Wingdings" panose="05000000000000000000" pitchFamily="2" charset="2"/>
-              </a:rPr>
-              <a:t>CommandRecord</a:t>
+              <a:t>Socket</a:t>
             </a:r>
             <a:endParaRPr lang="it-CH" sz="2000" dirty="0">
+              <a:solidFill>
+                <a:schemeClr val="tx1"/>
+              </a:solidFill>
+              <a:latin typeface="+mn-lt"/>
+              <a:cs typeface="+mn-cs"/>
               <a:sym typeface="Wingdings" panose="05000000000000000000" pitchFamily="2" charset="2"/>
             </a:endParaRPr>
           </a:p>
           <a:p>
             <a:pPr marL="285750" indent="-285750">
               <a:lnSpc>
-                <a:spcPct val="250000"/>
+                <a:spcPct val="200000"/>
               </a:lnSpc>
               <a:buFont typeface="Arial" panose="020B0604020202020204" pitchFamily="34" charset="0"/>
               <a:buChar char="•"/>
             </a:pPr>
             <a:r>
               <a:rPr lang="it-CH" sz="2000" dirty="0">
+                <a:solidFill>
+                  <a:schemeClr val="tx1"/>
+                </a:solidFill>
+                <a:latin typeface="+mn-lt"/>
+                <a:cs typeface="+mn-cs"/>
                 <a:sym typeface="Wingdings" panose="05000000000000000000" pitchFamily="2" charset="2"/>
               </a:rPr>
-              <a:t>Genera + Salva la registrazione</a:t>
-            </a:r>
+              <a:t>Utilizzato da:</a:t>
+            </a:r>
+          </a:p>
+          <a:p>
+            <a:pPr marL="1028700" lvl="1">
+              <a:lnSpc>
+                <a:spcPct val="200000"/>
+              </a:lnSpc>
+              <a:buFont typeface="Arial" panose="020B0604020202020204" pitchFamily="34" charset="0"/>
+              <a:buChar char="•"/>
+            </a:pPr>
+            <a:r>
+              <a:rPr lang="it-CH" sz="2000" dirty="0" err="1">
+                <a:sym typeface="Wingdings" panose="05000000000000000000" pitchFamily="2" charset="2"/>
+              </a:rPr>
+              <a:t>DroneController</a:t>
+            </a:r>
+            <a:endParaRPr lang="it-CH" sz="2000" dirty="0">
+              <a:sym typeface="Wingdings" panose="05000000000000000000" pitchFamily="2" charset="2"/>
+            </a:endParaRPr>
+          </a:p>
+          <a:p>
+            <a:pPr marL="1028700" lvl="1">
+              <a:lnSpc>
+                <a:spcPct val="200000"/>
+              </a:lnSpc>
+              <a:buFont typeface="Arial" panose="020B0604020202020204" pitchFamily="34" charset="0"/>
+              <a:buChar char="•"/>
+            </a:pPr>
+            <a:r>
+              <a:rPr lang="it-CH" sz="2000" dirty="0" err="1">
+                <a:sym typeface="Wingdings" panose="05000000000000000000" pitchFamily="2" charset="2"/>
+              </a:rPr>
+              <a:t>DroneControllerMonitor</a:t>
+            </a:r>
+            <a:endParaRPr lang="it-CH" sz="2000" dirty="0">
+              <a:sym typeface="Wingdings" panose="05000000000000000000" pitchFamily="2" charset="2"/>
+            </a:endParaRPr>
           </a:p>
         </p:txBody>
       </p:sp>
     </p:spTree>
     <p:extLst>
       <p:ext uri="{BB962C8B-B14F-4D97-AF65-F5344CB8AC3E}">
-        <p14:creationId xmlns:p14="http://schemas.microsoft.com/office/powerpoint/2010/main" val="4176927173"/>
+        <p14:creationId xmlns:p14="http://schemas.microsoft.com/office/powerpoint/2010/main" val="3679172245"/>
       </p:ext>
     </p:extLst>
   </p:cSld>
@@ -6719,7 +6879,7 @@
           <a:p>
             <a:r>
               <a:rPr lang="it-CH" dirty="0" err="1"/>
-              <a:t>DroneSimulator</a:t>
+              <a:t>DroneController</a:t>
             </a:r>
             <a:endParaRPr lang="it-CH" dirty="0"/>
           </a:p>
@@ -6753,7 +6913,11 @@
           <a:p>
             <a:r>
               <a:rPr lang="it-CH" sz="2800" dirty="0"/>
-              <a:t>Classe Simulator</a:t>
+              <a:t>Classe </a:t>
+            </a:r>
+            <a:r>
+              <a:rPr lang="it-CH" sz="2800" dirty="0" err="1"/>
+              <a:t>FlightRecorder</a:t>
             </a:r>
             <a:r>
               <a:rPr lang="it-IT" sz="2800" dirty="0"/>
@@ -6791,7 +6955,7 @@
           <a:p>
             <a:pPr marL="285750" indent="-285750">
               <a:lnSpc>
-                <a:spcPct val="300000"/>
+                <a:spcPct val="250000"/>
               </a:lnSpc>
               <a:buFont typeface="Arial" panose="020B0604020202020204" pitchFamily="34" charset="0"/>
               <a:buChar char="•"/>
@@ -6800,13 +6964,25 @@
               <a:rPr lang="it-CH" sz="2000" dirty="0">
                 <a:sym typeface="Wingdings" panose="05000000000000000000" pitchFamily="2" charset="2"/>
               </a:rPr>
-              <a:t>Riceve comandi  </a:t>
+              <a:t>Utilizza </a:t>
             </a:r>
             <a:r>
               <a:rPr lang="it-CH" sz="2000" dirty="0" err="1">
                 <a:sym typeface="Wingdings" panose="05000000000000000000" pitchFamily="2" charset="2"/>
               </a:rPr>
-              <a:t>Socket</a:t>
+              <a:t>CommandBuffer</a:t>
+            </a:r>
+            <a:r>
+              <a:rPr lang="it-CH" sz="2000" dirty="0">
+                <a:sym typeface="Wingdings" panose="05000000000000000000" pitchFamily="2" charset="2"/>
+              </a:rPr>
+              <a:t> + </a:t>
+            </a:r>
+            <a:r>
+              <a:rPr lang="it-CH" sz="2000" dirty="0" err="1">
+                <a:sym typeface="Wingdings" panose="05000000000000000000" pitchFamily="2" charset="2"/>
+              </a:rPr>
+              <a:t>CommandRecord</a:t>
             </a:r>
             <a:endParaRPr lang="it-CH" sz="2000" dirty="0">
               <a:sym typeface="Wingdings" panose="05000000000000000000" pitchFamily="2" charset="2"/>
@@ -6815,7 +6991,7 @@
           <a:p>
             <a:pPr marL="285750" indent="-285750">
               <a:lnSpc>
-                <a:spcPct val="300000"/>
+                <a:spcPct val="250000"/>
               </a:lnSpc>
               <a:buFont typeface="Arial" panose="020B0604020202020204" pitchFamily="34" charset="0"/>
               <a:buChar char="•"/>
@@ -6824,24 +7000,15 @@
               <a:rPr lang="it-CH" sz="2000" dirty="0">
                 <a:sym typeface="Wingdings" panose="05000000000000000000" pitchFamily="2" charset="2"/>
               </a:rPr>
-              <a:t>Inoltro comandi  </a:t>
-            </a:r>
-            <a:r>
-              <a:rPr lang="it-CH" sz="2000" dirty="0" err="1">
-                <a:sym typeface="Wingdings" panose="05000000000000000000" pitchFamily="2" charset="2"/>
-              </a:rPr>
-              <a:t>CommandReader</a:t>
-            </a:r>
-            <a:endParaRPr lang="it-CH" sz="2000" dirty="0">
-              <a:sym typeface="Wingdings" panose="05000000000000000000" pitchFamily="2" charset="2"/>
-            </a:endParaRPr>
+              <a:t>Genera + Salva la registrazione</a:t>
+            </a:r>
           </a:p>
         </p:txBody>
       </p:sp>
     </p:spTree>
     <p:extLst>
       <p:ext uri="{BB962C8B-B14F-4D97-AF65-F5344CB8AC3E}">
-        <p14:creationId xmlns:p14="http://schemas.microsoft.com/office/powerpoint/2010/main" val="2078199158"/>
+        <p14:creationId xmlns:p14="http://schemas.microsoft.com/office/powerpoint/2010/main" val="4176927173"/>
       </p:ext>
     </p:extLst>
   </p:cSld>
@@ -6925,11 +7092,7 @@
           <a:p>
             <a:r>
               <a:rPr lang="it-CH" sz="2800" dirty="0"/>
-              <a:t>Classe </a:t>
-            </a:r>
-            <a:r>
-              <a:rPr lang="it-CH" sz="2800" dirty="0" err="1"/>
-              <a:t>CommandReader</a:t>
+              <a:t>Classe Simulator</a:t>
             </a:r>
             <a:r>
               <a:rPr lang="it-IT" sz="2800" dirty="0"/>
@@ -6965,49 +7128,59 @@
           <a:bodyPr/>
           <a:lstStyle/>
           <a:p>
-            <a:r>
-              <a:rPr lang="it-IT" sz="2000" dirty="0"/>
-              <a:t>Riceve i comandi dalla classe Simulator.</a:t>
-            </a:r>
-          </a:p>
-          <a:p>
-            <a:endParaRPr lang="it-IT" sz="2000" dirty="0"/>
-          </a:p>
-          <a:p>
-            <a:r>
-              <a:rPr lang="it-IT" sz="2000" dirty="0"/>
-              <a:t>Simula i comandi della SDK di Tello. </a:t>
-            </a:r>
-          </a:p>
-          <a:p>
-            <a:endParaRPr lang="it-IT" sz="2000" dirty="0"/>
-          </a:p>
-          <a:p>
-            <a:r>
-              <a:rPr lang="it-IT" sz="2000" dirty="0"/>
-              <a:t>Aggiorna le variabili contenenti informazioni su</a:t>
-            </a:r>
-            <a:br>
-              <a:rPr lang="it-IT" sz="2000" dirty="0"/>
-            </a:br>
-            <a:r>
-              <a:rPr lang="it-IT" sz="2000" dirty="0"/>
-              <a:t>Posizione e rotazione del drone.</a:t>
-            </a:r>
-          </a:p>
-          <a:p>
-            <a:pPr marL="342900" indent="-342900">
+            <a:pPr marL="285750" indent="-285750">
+              <a:lnSpc>
+                <a:spcPct val="300000"/>
+              </a:lnSpc>
               <a:buFont typeface="Arial" panose="020B0604020202020204" pitchFamily="34" charset="0"/>
               <a:buChar char="•"/>
             </a:pPr>
-            <a:endParaRPr lang="it-IT" sz="2000" dirty="0"/>
+            <a:r>
+              <a:rPr lang="it-CH" sz="2000" dirty="0">
+                <a:sym typeface="Wingdings" panose="05000000000000000000" pitchFamily="2" charset="2"/>
+              </a:rPr>
+              <a:t>Riceve comandi  </a:t>
+            </a:r>
+            <a:r>
+              <a:rPr lang="it-CH" sz="2000" dirty="0" err="1">
+                <a:sym typeface="Wingdings" panose="05000000000000000000" pitchFamily="2" charset="2"/>
+              </a:rPr>
+              <a:t>Socket</a:t>
+            </a:r>
+            <a:endParaRPr lang="it-CH" sz="2000" dirty="0">
+              <a:sym typeface="Wingdings" panose="05000000000000000000" pitchFamily="2" charset="2"/>
+            </a:endParaRPr>
+          </a:p>
+          <a:p>
+            <a:pPr marL="285750" indent="-285750">
+              <a:lnSpc>
+                <a:spcPct val="300000"/>
+              </a:lnSpc>
+              <a:buFont typeface="Arial" panose="020B0604020202020204" pitchFamily="34" charset="0"/>
+              <a:buChar char="•"/>
+            </a:pPr>
+            <a:r>
+              <a:rPr lang="it-CH" sz="2000" dirty="0">
+                <a:sym typeface="Wingdings" panose="05000000000000000000" pitchFamily="2" charset="2"/>
+              </a:rPr>
+              <a:t>Inoltro comandi  </a:t>
+            </a:r>
+            <a:r>
+              <a:rPr lang="it-CH" sz="2000" dirty="0" err="1">
+                <a:sym typeface="Wingdings" panose="05000000000000000000" pitchFamily="2" charset="2"/>
+              </a:rPr>
+              <a:t>CommandReader</a:t>
+            </a:r>
+            <a:endParaRPr lang="it-CH" sz="2000" dirty="0">
+              <a:sym typeface="Wingdings" panose="05000000000000000000" pitchFamily="2" charset="2"/>
+            </a:endParaRPr>
           </a:p>
         </p:txBody>
       </p:sp>
     </p:spTree>
     <p:extLst>
       <p:ext uri="{BB962C8B-B14F-4D97-AF65-F5344CB8AC3E}">
-        <p14:creationId xmlns:p14="http://schemas.microsoft.com/office/powerpoint/2010/main" val="422939601"/>
+        <p14:creationId xmlns:p14="http://schemas.microsoft.com/office/powerpoint/2010/main" val="2078199158"/>
       </p:ext>
     </p:extLst>
   </p:cSld>
@@ -7094,6 +7267,172 @@
               <a:t>Classe </a:t>
             </a:r>
             <a:r>
+              <a:rPr lang="it-CH" sz="2800" dirty="0" err="1"/>
+              <a:t>CommandReader</a:t>
+            </a:r>
+            <a:r>
+              <a:rPr lang="it-IT" sz="2800" dirty="0"/>
+              <a:t> </a:t>
+            </a:r>
+            <a:endParaRPr lang="it-CH" sz="2800" dirty="0"/>
+          </a:p>
+        </p:txBody>
+      </p:sp>
+      <p:sp>
+        <p:nvSpPr>
+          <p:cNvPr id="4" name="Segnaposto contenuto 3">
+            <a:extLst>
+              <a:ext uri="{FF2B5EF4-FFF2-40B4-BE49-F238E27FC236}">
+                <a16:creationId xmlns:a16="http://schemas.microsoft.com/office/drawing/2014/main" id="{13544A92-8328-4004-96C8-B60363828F13}"/>
+              </a:ext>
+            </a:extLst>
+          </p:cNvPr>
+          <p:cNvSpPr>
+            <a:spLocks noGrp="1"/>
+          </p:cNvSpPr>
+          <p:nvPr>
+            <p:ph idx="10"/>
+          </p:nvPr>
+        </p:nvSpPr>
+        <p:spPr>
+          <a:xfrm>
+            <a:off x="1990056" y="1664245"/>
+            <a:ext cx="6912768" cy="2995737"/>
+          </a:xfrm>
+        </p:spPr>
+        <p:txBody>
+          <a:bodyPr/>
+          <a:lstStyle/>
+          <a:p>
+            <a:r>
+              <a:rPr lang="it-IT" sz="2000" dirty="0"/>
+              <a:t>Riceve i comandi dalla classe Simulator.</a:t>
+            </a:r>
+          </a:p>
+          <a:p>
+            <a:endParaRPr lang="it-IT" sz="2000" dirty="0"/>
+          </a:p>
+          <a:p>
+            <a:r>
+              <a:rPr lang="it-IT" sz="2000" dirty="0"/>
+              <a:t>Simula i comandi della SDK di Tello. </a:t>
+            </a:r>
+          </a:p>
+          <a:p>
+            <a:endParaRPr lang="it-IT" sz="2000" dirty="0"/>
+          </a:p>
+          <a:p>
+            <a:r>
+              <a:rPr lang="it-IT" sz="2000" dirty="0"/>
+              <a:t>Aggiorna le variabili contenenti informazioni su</a:t>
+            </a:r>
+            <a:br>
+              <a:rPr lang="it-IT" sz="2000" dirty="0"/>
+            </a:br>
+            <a:r>
+              <a:rPr lang="it-IT" sz="2000" dirty="0"/>
+              <a:t>Posizione e rotazione del drone.</a:t>
+            </a:r>
+          </a:p>
+          <a:p>
+            <a:pPr marL="342900" indent="-342900">
+              <a:buFont typeface="Arial" panose="020B0604020202020204" pitchFamily="34" charset="0"/>
+              <a:buChar char="•"/>
+            </a:pPr>
+            <a:endParaRPr lang="it-IT" sz="2000" dirty="0"/>
+          </a:p>
+        </p:txBody>
+      </p:sp>
+    </p:spTree>
+    <p:extLst>
+      <p:ext uri="{BB962C8B-B14F-4D97-AF65-F5344CB8AC3E}">
+        <p14:creationId xmlns:p14="http://schemas.microsoft.com/office/powerpoint/2010/main" val="422939601"/>
+      </p:ext>
+    </p:extLst>
+  </p:cSld>
+  <p:clrMapOvr>
+    <a:masterClrMapping/>
+  </p:clrMapOvr>
+</p:sld>
+</file>
+
+<file path=ppt/slides/slide23.xml><?xml version="1.0" encoding="utf-8"?>
+<p:sld xmlns:a="http://schemas.openxmlformats.org/drawingml/2006/main" xmlns:r="http://schemas.openxmlformats.org/officeDocument/2006/relationships" xmlns:p="http://schemas.openxmlformats.org/presentationml/2006/main">
+  <p:cSld>
+    <p:spTree>
+      <p:nvGrpSpPr>
+        <p:cNvPr id="1" name=""/>
+        <p:cNvGrpSpPr/>
+        <p:nvPr/>
+      </p:nvGrpSpPr>
+      <p:grpSpPr>
+        <a:xfrm>
+          <a:off x="0" y="0"/>
+          <a:ext cx="0" cy="0"/>
+          <a:chOff x="0" y="0"/>
+          <a:chExt cx="0" cy="0"/>
+        </a:xfrm>
+      </p:grpSpPr>
+      <p:sp>
+        <p:nvSpPr>
+          <p:cNvPr id="2" name="Titolo 1">
+            <a:extLst>
+              <a:ext uri="{FF2B5EF4-FFF2-40B4-BE49-F238E27FC236}">
+                <a16:creationId xmlns:a16="http://schemas.microsoft.com/office/drawing/2014/main" id="{1C9728DE-DCC3-47F3-A9A7-4840BBF3A649}"/>
+              </a:ext>
+            </a:extLst>
+          </p:cNvPr>
+          <p:cNvSpPr>
+            <a:spLocks noGrp="1"/>
+          </p:cNvSpPr>
+          <p:nvPr>
+            <p:ph type="title"/>
+          </p:nvPr>
+        </p:nvSpPr>
+        <p:spPr/>
+        <p:txBody>
+          <a:bodyPr/>
+          <a:lstStyle/>
+          <a:p>
+            <a:r>
+              <a:rPr lang="it-CH" dirty="0" err="1"/>
+              <a:t>DroneSimulator</a:t>
+            </a:r>
+            <a:endParaRPr lang="it-CH" dirty="0"/>
+          </a:p>
+        </p:txBody>
+      </p:sp>
+      <p:sp>
+        <p:nvSpPr>
+          <p:cNvPr id="3" name="Segnaposto contenuto 2">
+            <a:extLst>
+              <a:ext uri="{FF2B5EF4-FFF2-40B4-BE49-F238E27FC236}">
+                <a16:creationId xmlns:a16="http://schemas.microsoft.com/office/drawing/2014/main" id="{A9782E92-4646-4216-BC0B-9AFBD5130E30}"/>
+              </a:ext>
+            </a:extLst>
+          </p:cNvPr>
+          <p:cNvSpPr>
+            <a:spLocks noGrp="1"/>
+          </p:cNvSpPr>
+          <p:nvPr>
+            <p:ph idx="1"/>
+          </p:nvPr>
+        </p:nvSpPr>
+        <p:spPr>
+          <a:xfrm>
+            <a:off x="2000747" y="884466"/>
+            <a:ext cx="6912768" cy="460648"/>
+          </a:xfrm>
+        </p:spPr>
+        <p:txBody>
+          <a:bodyPr/>
+          <a:lstStyle/>
+          <a:p>
+            <a:r>
+              <a:rPr lang="it-CH" sz="2800" dirty="0"/>
+              <a:t>Classe </a:t>
+            </a:r>
+            <a:r>
               <a:rPr lang="it-IT" sz="2800" dirty="0" err="1"/>
               <a:t>TelloChartFrame</a:t>
             </a:r>
@@ -7185,7 +7524,7 @@
 </p:sld>
 </file>
 
-<file path=ppt/slides/slide23.xml><?xml version="1.0" encoding="utf-8"?>
+<file path=ppt/slides/slide24.xml><?xml version="1.0" encoding="utf-8"?>
 <p:sld xmlns:a="http://schemas.openxmlformats.org/drawingml/2006/main" xmlns:r="http://schemas.openxmlformats.org/officeDocument/2006/relationships" xmlns:p="http://schemas.openxmlformats.org/presentationml/2006/main">
   <p:cSld>
     <p:spTree>
@@ -7836,41 +8175,6 @@
       </p:sp>
       <p:pic>
         <p:nvPicPr>
-          <p:cNvPr id="5" name="Segnaposto contenuto 4">
-            <a:extLst>
-              <a:ext uri="{FF2B5EF4-FFF2-40B4-BE49-F238E27FC236}">
-                <a16:creationId xmlns:a16="http://schemas.microsoft.com/office/drawing/2014/main" id="{898D7E89-0043-4101-8223-BD420A471666}"/>
-              </a:ext>
-            </a:extLst>
-          </p:cNvPr>
-          <p:cNvPicPr>
-            <a:picLocks noGrp="1" noChangeAspect="1"/>
-          </p:cNvPicPr>
-          <p:nvPr>
-            <p:ph idx="10"/>
-          </p:nvPr>
-        </p:nvPicPr>
-        <p:blipFill>
-          <a:blip r:embed="rId3" cstate="print">
-            <a:extLst>
-              <a:ext uri="{28A0092B-C50C-407E-A947-70E740481C1C}">
-                <a14:useLocalDpi xmlns:a14="http://schemas.microsoft.com/office/drawing/2010/main" val="0"/>
-              </a:ext>
-            </a:extLst>
-          </a:blip>
-          <a:stretch>
-            <a:fillRect/>
-          </a:stretch>
-        </p:blipFill>
-        <p:spPr>
-          <a:xfrm>
-            <a:off x="1627909" y="1059582"/>
-            <a:ext cx="7065506" cy="3313821"/>
-          </a:xfrm>
-        </p:spPr>
-      </p:pic>
-      <p:pic>
-        <p:nvPicPr>
           <p:cNvPr id="2050" name="Picture 2" descr="Risultati immagini per finish race icon">
             <a:extLst>
               <a:ext uri="{FF2B5EF4-FFF2-40B4-BE49-F238E27FC236}">
@@ -7884,7 +8188,7 @@
           <p:nvPr/>
         </p:nvPicPr>
         <p:blipFill>
-          <a:blip r:embed="rId4" cstate="print">
+          <a:blip r:embed="rId3" cstate="print">
             <a:extLst>
               <a:ext uri="{28A0092B-C50C-407E-A947-70E740481C1C}">
                 <a14:useLocalDpi xmlns:a14="http://schemas.microsoft.com/office/drawing/2010/main" val="0"/>
@@ -7914,6 +8218,41 @@
               </a14:hiddenFill>
             </a:ext>
           </a:extLst>
+        </p:spPr>
+      </p:pic>
+      <p:pic>
+        <p:nvPicPr>
+          <p:cNvPr id="8" name="Segnaposto contenuto 7">
+            <a:extLst>
+              <a:ext uri="{FF2B5EF4-FFF2-40B4-BE49-F238E27FC236}">
+                <a16:creationId xmlns:a16="http://schemas.microsoft.com/office/drawing/2014/main" id="{16008C45-EC87-4F77-BE82-735D4DE54469}"/>
+              </a:ext>
+            </a:extLst>
+          </p:cNvPr>
+          <p:cNvPicPr>
+            <a:picLocks noGrp="1" noChangeAspect="1"/>
+          </p:cNvPicPr>
+          <p:nvPr>
+            <p:ph idx="10"/>
+          </p:nvPr>
+        </p:nvPicPr>
+        <p:blipFill>
+          <a:blip r:embed="rId4" cstate="print">
+            <a:extLst>
+              <a:ext uri="{28A0092B-C50C-407E-A947-70E740481C1C}">
+                <a14:useLocalDpi xmlns:a14="http://schemas.microsoft.com/office/drawing/2010/main" val="0"/>
+              </a:ext>
+            </a:extLst>
+          </a:blip>
+          <a:stretch>
+            <a:fillRect/>
+          </a:stretch>
+        </p:blipFill>
+        <p:spPr>
+          <a:xfrm>
+            <a:off x="1691680" y="1093104"/>
+            <a:ext cx="7066800" cy="3316765"/>
+          </a:xfrm>
         </p:spPr>
       </p:pic>
     </p:spTree>
@@ -7968,7 +8307,7 @@
           <a:lstStyle/>
           <a:p>
             <a:r>
-              <a:rPr lang="it-CH" dirty="0"/>
+              <a:rPr lang="it-CH" sz="4000" dirty="0"/>
               <a:t>GANTT: DIFFERENZE</a:t>
             </a:r>
           </a:p>
@@ -7995,7 +8334,50 @@
           <a:bodyPr/>
           <a:lstStyle/>
           <a:p>
-            <a:endParaRPr lang="it-CH"/>
+            <a:pPr marL="285750" indent="-285750">
+              <a:lnSpc>
+                <a:spcPct val="200000"/>
+              </a:lnSpc>
+              <a:buFont typeface="Arial" panose="020B0604020202020204" pitchFamily="34" charset="0"/>
+              <a:buChar char="•"/>
+            </a:pPr>
+            <a:r>
+              <a:rPr lang="it-CH" sz="2800" dirty="0"/>
+              <a:t>Progettazione + Implementazione</a:t>
+            </a:r>
+          </a:p>
+          <a:p>
+            <a:pPr marL="1028700" lvl="1">
+              <a:lnSpc>
+                <a:spcPct val="200000"/>
+              </a:lnSpc>
+              <a:buFont typeface="Arial" panose="020B0604020202020204" pitchFamily="34" charset="0"/>
+              <a:buChar char="•"/>
+            </a:pPr>
+            <a:r>
+              <a:rPr lang="it-CH" sz="2400" dirty="0"/>
+              <a:t>Informazioni</a:t>
+            </a:r>
+          </a:p>
+          <a:p>
+            <a:pPr marL="1028700" lvl="1">
+              <a:lnSpc>
+                <a:spcPct val="200000"/>
+              </a:lnSpc>
+              <a:buFont typeface="Arial" panose="020B0604020202020204" pitchFamily="34" charset="0"/>
+              <a:buChar char="•"/>
+            </a:pPr>
+            <a:r>
+              <a:rPr lang="it-CH" sz="2400" dirty="0"/>
+              <a:t>Lavoro</a:t>
+            </a:r>
+          </a:p>
+          <a:p>
+            <a:pPr marL="285750" indent="-285750">
+              <a:buFont typeface="Arial" panose="020B0604020202020204" pitchFamily="34" charset="0"/>
+              <a:buChar char="•"/>
+            </a:pPr>
+            <a:endParaRPr lang="it-CH" dirty="0"/>
           </a:p>
         </p:txBody>
       </p:sp>
@@ -8132,7 +8514,7 @@
           <p:nvPr/>
         </p:nvPicPr>
         <p:blipFill>
-          <a:blip r:embed="rId2">
+          <a:blip r:embed="rId3">
             <a:extLst>
               <a:ext uri="{28A0092B-C50C-407E-A947-70E740481C1C}">
                 <a14:useLocalDpi xmlns:a14="http://schemas.microsoft.com/office/drawing/2010/main" val="0"/>
@@ -8217,7 +8599,7 @@
           <p:nvPr/>
         </p:nvPicPr>
         <p:blipFill rotWithShape="1">
-          <a:blip r:embed="rId2">
+          <a:blip r:embed="rId3">
             <a:extLst>
               <a:ext uri="{28A0092B-C50C-407E-A947-70E740481C1C}">
                 <a14:useLocalDpi xmlns:a14="http://schemas.microsoft.com/office/drawing/2010/main" val="0"/>

</xml_diff>